<commit_message>
Hardware: update the silkscreen
</commit_message>
<xml_diff>
--- a/Hardware/Tympan A Board/Notional Layout of Creare Audio Board.pptx
+++ b/Hardware/Tympan A Board/Notional Layout of Creare Audio Board.pptx
@@ -5,14 +5,15 @@
     <p:sldMasterId id="2147483648" r:id="rId1"/>
   </p:sldMasterIdLst>
   <p:notesMasterIdLst>
-    <p:notesMasterId r:id="rId4"/>
+    <p:notesMasterId r:id="rId5"/>
   </p:notesMasterIdLst>
   <p:sldIdLst>
     <p:sldId id="256" r:id="rId2"/>
     <p:sldId id="262" r:id="rId3"/>
+    <p:sldId id="263" r:id="rId4"/>
   </p:sldIdLst>
   <p:sldSz cx="9144000" cy="6858000" type="screen4x3"/>
-  <p:notesSz cx="7010400" cy="9296400"/>
+  <p:notesSz cx="7315200" cy="9601200"/>
   <p:defaultTextStyle>
     <a:defPPr>
       <a:defRPr lang="en-US"/>
@@ -146,14 +147,14 @@
         <p:spPr>
           <a:xfrm>
             <a:off x="0" y="0"/>
-            <a:ext cx="3038475" cy="465138"/>
+            <a:ext cx="3170583" cy="480388"/>
           </a:xfrm>
           <a:prstGeom prst="rect">
             <a:avLst/>
           </a:prstGeom>
         </p:spPr>
         <p:txBody>
-          <a:bodyPr vert="horz" lIns="91440" tIns="45720" rIns="91440" bIns="45720" rtlCol="0"/>
+          <a:bodyPr vert="horz" lIns="94851" tIns="47425" rIns="94851" bIns="47425" rtlCol="0"/>
           <a:lstStyle>
             <a:lvl1pPr algn="l">
               <a:defRPr sz="1200"/>
@@ -176,15 +177,15 @@
         </p:nvSpPr>
         <p:spPr>
           <a:xfrm>
-            <a:off x="3970338" y="0"/>
-            <a:ext cx="3038475" cy="465138"/>
+            <a:off x="4142962" y="0"/>
+            <a:ext cx="3170583" cy="480388"/>
           </a:xfrm>
           <a:prstGeom prst="rect">
             <a:avLst/>
           </a:prstGeom>
         </p:spPr>
         <p:txBody>
-          <a:bodyPr vert="horz" lIns="91440" tIns="45720" rIns="91440" bIns="45720" rtlCol="0"/>
+          <a:bodyPr vert="horz" lIns="94851" tIns="47425" rIns="94851" bIns="47425" rtlCol="0"/>
           <a:lstStyle>
             <a:lvl1pPr algn="r">
               <a:defRPr sz="1200"/>
@@ -193,7 +194,7 @@
           <a:p>
             <a:fld id="{025225F7-C78B-4761-951C-5881CFCBE33B}" type="datetimeFigureOut">
               <a:rPr lang="en-US" smtClean="0"/>
-              <a:t>12/6/2016</a:t>
+              <a:t>12/21/2016</a:t>
             </a:fld>
             <a:endParaRPr lang="en-US"/>
           </a:p>
@@ -211,8 +212,8 @@
         </p:nvSpPr>
         <p:spPr>
           <a:xfrm>
-            <a:off x="1181100" y="696913"/>
-            <a:ext cx="4648200" cy="3486150"/>
+            <a:off x="1257300" y="719138"/>
+            <a:ext cx="4800600" cy="3600450"/>
           </a:xfrm>
           <a:prstGeom prst="rect">
             <a:avLst/>
@@ -225,7 +226,7 @@
           </a:ln>
         </p:spPr>
         <p:txBody>
-          <a:bodyPr vert="horz" lIns="91440" tIns="45720" rIns="91440" bIns="45720" rtlCol="0" anchor="ctr"/>
+          <a:bodyPr vert="horz" lIns="94851" tIns="47425" rIns="94851" bIns="47425" rtlCol="0" anchor="ctr"/>
           <a:lstStyle/>
           <a:p>
             <a:endParaRPr lang="en-US"/>
@@ -244,15 +245,15 @@
         </p:nvSpPr>
         <p:spPr>
           <a:xfrm>
-            <a:off x="701675" y="4416425"/>
-            <a:ext cx="5607050" cy="4183063"/>
+            <a:off x="732183" y="4561226"/>
+            <a:ext cx="5850835" cy="4320213"/>
           </a:xfrm>
           <a:prstGeom prst="rect">
             <a:avLst/>
           </a:prstGeom>
         </p:spPr>
         <p:txBody>
-          <a:bodyPr vert="horz" lIns="91440" tIns="45720" rIns="91440" bIns="45720" rtlCol="0"/>
+          <a:bodyPr vert="horz" lIns="94851" tIns="47425" rIns="94851" bIns="47425" rtlCol="0"/>
           <a:lstStyle/>
           <a:p>
             <a:pPr lvl="0"/>
@@ -304,15 +305,15 @@
         </p:nvSpPr>
         <p:spPr>
           <a:xfrm>
-            <a:off x="0" y="8829675"/>
-            <a:ext cx="3038475" cy="465138"/>
+            <a:off x="0" y="9119173"/>
+            <a:ext cx="3170583" cy="480388"/>
           </a:xfrm>
           <a:prstGeom prst="rect">
             <a:avLst/>
           </a:prstGeom>
         </p:spPr>
         <p:txBody>
-          <a:bodyPr vert="horz" lIns="91440" tIns="45720" rIns="91440" bIns="45720" rtlCol="0" anchor="b"/>
+          <a:bodyPr vert="horz" lIns="94851" tIns="47425" rIns="94851" bIns="47425" rtlCol="0" anchor="b"/>
           <a:lstStyle>
             <a:lvl1pPr algn="l">
               <a:defRPr sz="1200"/>
@@ -335,15 +336,15 @@
         </p:nvSpPr>
         <p:spPr>
           <a:xfrm>
-            <a:off x="3970338" y="8829675"/>
-            <a:ext cx="3038475" cy="465138"/>
+            <a:off x="4142962" y="9119173"/>
+            <a:ext cx="3170583" cy="480388"/>
           </a:xfrm>
           <a:prstGeom prst="rect">
             <a:avLst/>
           </a:prstGeom>
         </p:spPr>
         <p:txBody>
-          <a:bodyPr vert="horz" lIns="91440" tIns="45720" rIns="91440" bIns="45720" rtlCol="0" anchor="b"/>
+          <a:bodyPr vert="horz" lIns="94851" tIns="47425" rIns="94851" bIns="47425" rtlCol="0" anchor="b"/>
           <a:lstStyle>
             <a:lvl1pPr algn="r">
               <a:defRPr sz="1200"/>
@@ -726,7 +727,7 @@
           <a:p>
             <a:fld id="{00E65A1E-9A89-4CDA-B96A-2FF4F0DBF2AD}" type="datetimeFigureOut">
               <a:rPr lang="en-US" smtClean="0"/>
-              <a:t>12/6/2016</a:t>
+              <a:t>12/21/2016</a:t>
             </a:fld>
             <a:endParaRPr lang="en-US"/>
           </a:p>
@@ -896,7 +897,7 @@
           <a:p>
             <a:fld id="{00E65A1E-9A89-4CDA-B96A-2FF4F0DBF2AD}" type="datetimeFigureOut">
               <a:rPr lang="en-US" smtClean="0"/>
-              <a:t>12/6/2016</a:t>
+              <a:t>12/21/2016</a:t>
             </a:fld>
             <a:endParaRPr lang="en-US"/>
           </a:p>
@@ -1076,7 +1077,7 @@
           <a:p>
             <a:fld id="{00E65A1E-9A89-4CDA-B96A-2FF4F0DBF2AD}" type="datetimeFigureOut">
               <a:rPr lang="en-US" smtClean="0"/>
-              <a:t>12/6/2016</a:t>
+              <a:t>12/21/2016</a:t>
             </a:fld>
             <a:endParaRPr lang="en-US"/>
           </a:p>
@@ -1246,7 +1247,7 @@
           <a:p>
             <a:fld id="{00E65A1E-9A89-4CDA-B96A-2FF4F0DBF2AD}" type="datetimeFigureOut">
               <a:rPr lang="en-US" smtClean="0"/>
-              <a:t>12/6/2016</a:t>
+              <a:t>12/21/2016</a:t>
             </a:fld>
             <a:endParaRPr lang="en-US"/>
           </a:p>
@@ -1492,7 +1493,7 @@
           <a:p>
             <a:fld id="{00E65A1E-9A89-4CDA-B96A-2FF4F0DBF2AD}" type="datetimeFigureOut">
               <a:rPr lang="en-US" smtClean="0"/>
-              <a:t>12/6/2016</a:t>
+              <a:t>12/21/2016</a:t>
             </a:fld>
             <a:endParaRPr lang="en-US"/>
           </a:p>
@@ -1780,7 +1781,7 @@
           <a:p>
             <a:fld id="{00E65A1E-9A89-4CDA-B96A-2FF4F0DBF2AD}" type="datetimeFigureOut">
               <a:rPr lang="en-US" smtClean="0"/>
-              <a:t>12/6/2016</a:t>
+              <a:t>12/21/2016</a:t>
             </a:fld>
             <a:endParaRPr lang="en-US"/>
           </a:p>
@@ -2202,7 +2203,7 @@
           <a:p>
             <a:fld id="{00E65A1E-9A89-4CDA-B96A-2FF4F0DBF2AD}" type="datetimeFigureOut">
               <a:rPr lang="en-US" smtClean="0"/>
-              <a:t>12/6/2016</a:t>
+              <a:t>12/21/2016</a:t>
             </a:fld>
             <a:endParaRPr lang="en-US"/>
           </a:p>
@@ -2320,7 +2321,7 @@
           <a:p>
             <a:fld id="{00E65A1E-9A89-4CDA-B96A-2FF4F0DBF2AD}" type="datetimeFigureOut">
               <a:rPr lang="en-US" smtClean="0"/>
-              <a:t>12/6/2016</a:t>
+              <a:t>12/21/2016</a:t>
             </a:fld>
             <a:endParaRPr lang="en-US"/>
           </a:p>
@@ -2415,7 +2416,7 @@
           <a:p>
             <a:fld id="{00E65A1E-9A89-4CDA-B96A-2FF4F0DBF2AD}" type="datetimeFigureOut">
               <a:rPr lang="en-US" smtClean="0"/>
-              <a:t>12/6/2016</a:t>
+              <a:t>12/21/2016</a:t>
             </a:fld>
             <a:endParaRPr lang="en-US"/>
           </a:p>
@@ -2692,7 +2693,7 @@
           <a:p>
             <a:fld id="{00E65A1E-9A89-4CDA-B96A-2FF4F0DBF2AD}" type="datetimeFigureOut">
               <a:rPr lang="en-US" smtClean="0"/>
-              <a:t>12/6/2016</a:t>
+              <a:t>12/21/2016</a:t>
             </a:fld>
             <a:endParaRPr lang="en-US"/>
           </a:p>
@@ -2945,7 +2946,7 @@
           <a:p>
             <a:fld id="{00E65A1E-9A89-4CDA-B96A-2FF4F0DBF2AD}" type="datetimeFigureOut">
               <a:rPr lang="en-US" smtClean="0"/>
-              <a:t>12/6/2016</a:t>
+              <a:t>12/21/2016</a:t>
             </a:fld>
             <a:endParaRPr lang="en-US"/>
           </a:p>
@@ -3158,7 +3159,7 @@
           <a:p>
             <a:fld id="{00E65A1E-9A89-4CDA-B96A-2FF4F0DBF2AD}" type="datetimeFigureOut">
               <a:rPr lang="en-US" smtClean="0"/>
-              <a:t>12/6/2016</a:t>
+              <a:t>12/21/2016</a:t>
             </a:fld>
             <a:endParaRPr lang="en-US"/>
           </a:p>
@@ -16439,15 +16440,7 @@
                 <a:pPr algn="ctr"/>
                 <a:r>
                   <a:rPr lang="en-US" sz="1000" dirty="0" smtClean="0"/>
-                  <a:t>PCB Cut-away to allow wiring from </a:t>
-                </a:r>
-                <a:r>
-                  <a:rPr lang="en-US" sz="1000" dirty="0" smtClean="0"/>
-                  <a:t>J4 </a:t>
-                </a:r>
-                <a:r>
-                  <a:rPr lang="en-US" sz="1000" dirty="0" smtClean="0"/>
-                  <a:t>to go to the battery underneath</a:t>
+                  <a:t>PCB Cut-away to allow wiring from J4 to go to the battery underneath</a:t>
                 </a:r>
                 <a:endParaRPr lang="en-US" sz="1000" dirty="0"/>
               </a:p>
@@ -16854,6 +16847,2624 @@
       </p:par>
     </p:tnLst>
   </p:timing>
+</p:sld>
+</file>
+
+<file path=ppt/slides/slide3.xml><?xml version="1.0" encoding="utf-8"?>
+<p:sld xmlns:a="http://schemas.openxmlformats.org/drawingml/2006/main" xmlns:r="http://schemas.openxmlformats.org/officeDocument/2006/relationships" xmlns:p="http://schemas.openxmlformats.org/presentationml/2006/main">
+  <p:cSld>
+    <p:spTree>
+      <p:nvGrpSpPr>
+        <p:cNvPr id="1" name=""/>
+        <p:cNvGrpSpPr/>
+        <p:nvPr/>
+      </p:nvGrpSpPr>
+      <p:grpSpPr>
+        <a:xfrm>
+          <a:off x="0" y="0"/>
+          <a:ext cx="0" cy="0"/>
+          <a:chOff x="0" y="0"/>
+          <a:chExt cx="0" cy="0"/>
+        </a:xfrm>
+      </p:grpSpPr>
+      <p:grpSp>
+        <p:nvGrpSpPr>
+          <p:cNvPr id="4" name="Group 3"/>
+          <p:cNvGrpSpPr/>
+          <p:nvPr/>
+        </p:nvGrpSpPr>
+        <p:grpSpPr>
+          <a:xfrm>
+            <a:off x="1036320" y="1676400"/>
+            <a:ext cx="6934200" cy="4968240"/>
+            <a:chOff x="1036320" y="1676400"/>
+            <a:chExt cx="6934200" cy="4968240"/>
+          </a:xfrm>
+        </p:grpSpPr>
+        <p:sp>
+          <p:nvSpPr>
+            <p:cNvPr id="3" name="Rectangle 2"/>
+            <p:cNvSpPr/>
+            <p:nvPr/>
+          </p:nvSpPr>
+          <p:spPr>
+            <a:xfrm>
+              <a:off x="1036320" y="1676400"/>
+              <a:ext cx="6934200" cy="4968240"/>
+            </a:xfrm>
+            <a:prstGeom prst="rect">
+              <a:avLst/>
+            </a:prstGeom>
+            <a:solidFill>
+              <a:schemeClr val="bg1"/>
+            </a:solidFill>
+            <a:ln>
+              <a:noFill/>
+            </a:ln>
+          </p:spPr>
+          <p:style>
+            <a:lnRef idx="2">
+              <a:schemeClr val="accent1">
+                <a:shade val="50000"/>
+              </a:schemeClr>
+            </a:lnRef>
+            <a:fillRef idx="1">
+              <a:schemeClr val="accent1"/>
+            </a:fillRef>
+            <a:effectRef idx="0">
+              <a:schemeClr val="accent1"/>
+            </a:effectRef>
+            <a:fontRef idx="minor">
+              <a:schemeClr val="lt1"/>
+            </a:fontRef>
+          </p:style>
+          <p:txBody>
+            <a:bodyPr rtlCol="0" anchor="ctr"/>
+            <a:lstStyle/>
+            <a:p>
+              <a:pPr algn="ctr"/>
+              <a:endParaRPr lang="en-US"/>
+            </a:p>
+          </p:txBody>
+        </p:sp>
+        <p:grpSp>
+          <p:nvGrpSpPr>
+            <p:cNvPr id="80" name="Group 79"/>
+            <p:cNvGrpSpPr/>
+            <p:nvPr/>
+          </p:nvGrpSpPr>
+          <p:grpSpPr>
+            <a:xfrm>
+              <a:off x="1128119" y="1768532"/>
+              <a:ext cx="5373196" cy="4787900"/>
+              <a:chOff x="1128119" y="1768532"/>
+              <a:chExt cx="5373196" cy="4787900"/>
+            </a:xfrm>
+          </p:grpSpPr>
+          <p:pic>
+            <p:nvPicPr>
+              <p:cNvPr id="1026" name="Picture 2"/>
+              <p:cNvPicPr>
+                <a:picLocks noChangeAspect="1" noChangeArrowheads="1"/>
+              </p:cNvPicPr>
+              <p:nvPr/>
+            </p:nvPicPr>
+            <p:blipFill rotWithShape="1">
+              <a:blip r:embed="rId2" cstate="print">
+                <a:extLst>
+                  <a:ext uri="{BEBA8EAE-BF5A-486C-A8C5-ECC9F3942E4B}">
+                    <a14:imgProps xmlns:a14="http://schemas.microsoft.com/office/drawing/2010/main">
+                      <a14:imgLayer r:embed="rId3">
+                        <a14:imgEffect>
+                          <a14:saturation sat="0"/>
+                        </a14:imgEffect>
+                      </a14:imgLayer>
+                    </a14:imgProps>
+                  </a:ext>
+                  <a:ext uri="{28A0092B-C50C-407E-A947-70E740481C1C}">
+                    <a14:useLocalDpi xmlns:a14="http://schemas.microsoft.com/office/drawing/2010/main" val="0"/>
+                  </a:ext>
+                </a:extLst>
+              </a:blip>
+              <a:srcRect l="34316" t="8510" r="31830" b="8510"/>
+              <a:stretch/>
+            </p:blipFill>
+            <p:spPr bwMode="auto">
+              <a:xfrm>
+                <a:off x="4939664" y="2414863"/>
+                <a:ext cx="1561651" cy="3675888"/>
+              </a:xfrm>
+              <a:prstGeom prst="rect">
+                <a:avLst/>
+              </a:prstGeom>
+              <a:noFill/>
+              <a:ln>
+                <a:noFill/>
+              </a:ln>
+              <a:extLst>
+                <a:ext uri="{909E8E84-426E-40DD-AFC4-6F175D3DCCD1}">
+                  <a14:hiddenFill xmlns:a14="http://schemas.microsoft.com/office/drawing/2010/main">
+                    <a:solidFill>
+                      <a:schemeClr val="accent1"/>
+                    </a:solidFill>
+                  </a14:hiddenFill>
+                </a:ext>
+                <a:ext uri="{91240B29-F687-4F45-9708-019B960494DF}">
+                  <a14:hiddenLine xmlns:a14="http://schemas.microsoft.com/office/drawing/2010/main" w="9525">
+                    <a:solidFill>
+                      <a:schemeClr val="tx1"/>
+                    </a:solidFill>
+                    <a:miter lim="800000"/>
+                    <a:headEnd/>
+                    <a:tailEnd/>
+                  </a14:hiddenLine>
+                </a:ext>
+              </a:extLst>
+            </p:spPr>
+          </p:pic>
+          <p:pic>
+            <p:nvPicPr>
+              <p:cNvPr id="1027" name="Picture 3"/>
+              <p:cNvPicPr>
+                <a:picLocks noChangeAspect="1" noChangeArrowheads="1"/>
+              </p:cNvPicPr>
+              <p:nvPr/>
+            </p:nvPicPr>
+            <p:blipFill rotWithShape="1">
+              <a:blip r:embed="rId4" cstate="print">
+                <a:extLst>
+                  <a:ext uri="{BEBA8EAE-BF5A-486C-A8C5-ECC9F3942E4B}">
+                    <a14:imgProps xmlns:a14="http://schemas.microsoft.com/office/drawing/2010/main">
+                      <a14:imgLayer r:embed="rId5">
+                        <a14:imgEffect>
+                          <a14:saturation sat="0"/>
+                        </a14:imgEffect>
+                      </a14:imgLayer>
+                    </a14:imgProps>
+                  </a:ext>
+                  <a:ext uri="{28A0092B-C50C-407E-A947-70E740481C1C}">
+                    <a14:useLocalDpi xmlns:a14="http://schemas.microsoft.com/office/drawing/2010/main" val="0"/>
+                  </a:ext>
+                </a:extLst>
+              </a:blip>
+              <a:srcRect l="34167" t="9112" r="32500" b="8666"/>
+              <a:stretch/>
+            </p:blipFill>
+            <p:spPr bwMode="auto">
+              <a:xfrm>
+                <a:off x="2742564" y="2379978"/>
+                <a:ext cx="1567266" cy="3712464"/>
+              </a:xfrm>
+              <a:prstGeom prst="rect">
+                <a:avLst/>
+              </a:prstGeom>
+              <a:noFill/>
+              <a:ln>
+                <a:noFill/>
+              </a:ln>
+              <a:extLst>
+                <a:ext uri="{909E8E84-426E-40DD-AFC4-6F175D3DCCD1}">
+                  <a14:hiddenFill xmlns:a14="http://schemas.microsoft.com/office/drawing/2010/main">
+                    <a:solidFill>
+                      <a:schemeClr val="accent1"/>
+                    </a:solidFill>
+                  </a14:hiddenFill>
+                </a:ext>
+                <a:ext uri="{91240B29-F687-4F45-9708-019B960494DF}">
+                  <a14:hiddenLine xmlns:a14="http://schemas.microsoft.com/office/drawing/2010/main" w="9525">
+                    <a:solidFill>
+                      <a:schemeClr val="tx1"/>
+                    </a:solidFill>
+                    <a:miter lim="800000"/>
+                    <a:headEnd/>
+                    <a:tailEnd/>
+                  </a14:hiddenLine>
+                </a:ext>
+              </a:extLst>
+            </p:spPr>
+          </p:pic>
+          <p:sp>
+            <p:nvSpPr>
+              <p:cNvPr id="7" name="TextBox 6"/>
+              <p:cNvSpPr txBox="1"/>
+              <p:nvPr/>
+            </p:nvSpPr>
+            <p:spPr>
+              <a:xfrm>
+                <a:off x="3266190" y="1768532"/>
+                <a:ext cx="520014" cy="369332"/>
+              </a:xfrm>
+              <a:prstGeom prst="rect">
+                <a:avLst/>
+              </a:prstGeom>
+              <a:noFill/>
+            </p:spPr>
+            <p:txBody>
+              <a:bodyPr wrap="none" rtlCol="0">
+                <a:spAutoFit/>
+              </a:bodyPr>
+              <a:lstStyle/>
+              <a:p>
+                <a:r>
+                  <a:rPr lang="en-US" dirty="0" smtClean="0"/>
+                  <a:t>Top</a:t>
+                </a:r>
+                <a:endParaRPr lang="en-US" dirty="0"/>
+              </a:p>
+            </p:txBody>
+          </p:sp>
+          <p:sp>
+            <p:nvSpPr>
+              <p:cNvPr id="10" name="TextBox 9"/>
+              <p:cNvSpPr txBox="1"/>
+              <p:nvPr/>
+            </p:nvSpPr>
+            <p:spPr>
+              <a:xfrm>
+                <a:off x="4950085" y="1768532"/>
+                <a:ext cx="1540806" cy="530915"/>
+              </a:xfrm>
+              <a:prstGeom prst="rect">
+                <a:avLst/>
+              </a:prstGeom>
+              <a:noFill/>
+            </p:spPr>
+            <p:txBody>
+              <a:bodyPr wrap="none" rtlCol="0">
+                <a:spAutoFit/>
+              </a:bodyPr>
+              <a:lstStyle/>
+              <a:p>
+                <a:pPr algn="ctr"/>
+                <a:r>
+                  <a:rPr lang="en-US" dirty="0" smtClean="0"/>
+                  <a:t>Bottom</a:t>
+                </a:r>
+              </a:p>
+              <a:p>
+                <a:pPr algn="ctr"/>
+                <a:r>
+                  <a:rPr lang="en-US" sz="1050" dirty="0" smtClean="0"/>
+                  <a:t>(as viewed from bottom)</a:t>
+                </a:r>
+                <a:endParaRPr lang="en-US" sz="1050" dirty="0"/>
+              </a:p>
+            </p:txBody>
+          </p:sp>
+          <p:sp>
+            <p:nvSpPr>
+              <p:cNvPr id="8" name="TextBox 7"/>
+              <p:cNvSpPr txBox="1"/>
+              <p:nvPr/>
+            </p:nvSpPr>
+            <p:spPr>
+              <a:xfrm rot="5400000">
+                <a:off x="3647309" y="2686632"/>
+                <a:ext cx="405880" cy="169277"/>
+              </a:xfrm>
+              <a:prstGeom prst="rect">
+                <a:avLst/>
+              </a:prstGeom>
+              <a:noFill/>
+            </p:spPr>
+            <p:txBody>
+              <a:bodyPr wrap="none" rtlCol="0">
+                <a:spAutoFit/>
+              </a:bodyPr>
+              <a:lstStyle/>
+              <a:p>
+                <a:r>
+                  <a:rPr lang="en-US" sz="500" b="1" dirty="0" smtClean="0">
+                    <a:solidFill>
+                      <a:srgbClr val="FF0000"/>
+                    </a:solidFill>
+                  </a:rPr>
+                  <a:t>PHONES</a:t>
+                </a:r>
+                <a:endParaRPr lang="en-US" sz="500" b="1" dirty="0">
+                  <a:solidFill>
+                    <a:srgbClr val="FF0000"/>
+                  </a:solidFill>
+                </a:endParaRPr>
+              </a:p>
+            </p:txBody>
+          </p:sp>
+          <p:sp>
+            <p:nvSpPr>
+              <p:cNvPr id="14" name="TextBox 13"/>
+              <p:cNvSpPr txBox="1"/>
+              <p:nvPr/>
+            </p:nvSpPr>
+            <p:spPr>
+              <a:xfrm rot="5400000">
+                <a:off x="2728752" y="2686633"/>
+                <a:ext cx="351378" cy="169277"/>
+              </a:xfrm>
+              <a:prstGeom prst="rect">
+                <a:avLst/>
+              </a:prstGeom>
+              <a:noFill/>
+            </p:spPr>
+            <p:txBody>
+              <a:bodyPr wrap="none" rtlCol="0">
+                <a:spAutoFit/>
+              </a:bodyPr>
+              <a:lstStyle/>
+              <a:p>
+                <a:r>
+                  <a:rPr lang="en-US" sz="500" b="1" dirty="0" smtClean="0">
+                    <a:solidFill>
+                      <a:srgbClr val="FF0000"/>
+                    </a:solidFill>
+                  </a:rPr>
+                  <a:t>INPUT</a:t>
+                </a:r>
+                <a:endParaRPr lang="en-US" sz="500" b="1" dirty="0">
+                  <a:solidFill>
+                    <a:srgbClr val="FF0000"/>
+                  </a:solidFill>
+                </a:endParaRPr>
+              </a:p>
+            </p:txBody>
+          </p:sp>
+          <p:sp>
+            <p:nvSpPr>
+              <p:cNvPr id="15" name="TextBox 14"/>
+              <p:cNvSpPr txBox="1"/>
+              <p:nvPr/>
+            </p:nvSpPr>
+            <p:spPr>
+              <a:xfrm rot="5400000">
+                <a:off x="2777167" y="3558005"/>
+                <a:ext cx="269626" cy="169277"/>
+              </a:xfrm>
+              <a:prstGeom prst="rect">
+                <a:avLst/>
+              </a:prstGeom>
+              <a:noFill/>
+            </p:spPr>
+            <p:txBody>
+              <a:bodyPr wrap="none" rtlCol="0">
+                <a:spAutoFit/>
+              </a:bodyPr>
+              <a:lstStyle/>
+              <a:p>
+                <a:r>
+                  <a:rPr lang="en-US" sz="500" b="1" dirty="0" smtClean="0">
+                    <a:solidFill>
+                      <a:srgbClr val="FF0000"/>
+                    </a:solidFill>
+                  </a:rPr>
+                  <a:t>ON</a:t>
+                </a:r>
+                <a:endParaRPr lang="en-US" sz="500" b="1" dirty="0">
+                  <a:solidFill>
+                    <a:srgbClr val="FF0000"/>
+                  </a:solidFill>
+                </a:endParaRPr>
+              </a:p>
+            </p:txBody>
+          </p:sp>
+          <p:sp>
+            <p:nvSpPr>
+              <p:cNvPr id="16" name="TextBox 15"/>
+              <p:cNvSpPr txBox="1"/>
+              <p:nvPr/>
+            </p:nvSpPr>
+            <p:spPr>
+              <a:xfrm rot="5400000">
+                <a:off x="2966700" y="5475053"/>
+                <a:ext cx="162865" cy="113877"/>
+              </a:xfrm>
+              <a:prstGeom prst="rect">
+                <a:avLst/>
+              </a:prstGeom>
+              <a:noFill/>
+            </p:spPr>
+            <p:txBody>
+              <a:bodyPr wrap="none" lIns="45720" tIns="18288" rIns="45720" bIns="18288" rtlCol="0">
+                <a:spAutoFit/>
+              </a:bodyPr>
+              <a:lstStyle/>
+              <a:p>
+                <a:pPr algn="r"/>
+                <a:r>
+                  <a:rPr lang="en-US" sz="500" b="1" dirty="0" smtClean="0">
+                    <a:solidFill>
+                      <a:srgbClr val="FF0000"/>
+                    </a:solidFill>
+                  </a:rPr>
+                  <a:t>A1</a:t>
+                </a:r>
+                <a:endParaRPr lang="en-US" sz="500" b="1" dirty="0">
+                  <a:solidFill>
+                    <a:srgbClr val="FF0000"/>
+                  </a:solidFill>
+                </a:endParaRPr>
+              </a:p>
+            </p:txBody>
+          </p:sp>
+          <p:sp>
+            <p:nvSpPr>
+              <p:cNvPr id="17" name="TextBox 16"/>
+              <p:cNvSpPr txBox="1"/>
+              <p:nvPr/>
+            </p:nvSpPr>
+            <p:spPr>
+              <a:xfrm>
+                <a:off x="2862919" y="3293308"/>
+                <a:ext cx="351378" cy="169277"/>
+              </a:xfrm>
+              <a:prstGeom prst="rect">
+                <a:avLst/>
+              </a:prstGeom>
+              <a:noFill/>
+            </p:spPr>
+            <p:txBody>
+              <a:bodyPr wrap="none" rtlCol="0">
+                <a:spAutoFit/>
+              </a:bodyPr>
+              <a:lstStyle/>
+              <a:p>
+                <a:r>
+                  <a:rPr lang="en-US" sz="500" b="1" dirty="0" smtClean="0">
+                    <a:solidFill>
+                      <a:srgbClr val="FF0000"/>
+                    </a:solidFill>
+                  </a:rPr>
+                  <a:t>RIGHT</a:t>
+                </a:r>
+                <a:endParaRPr lang="en-US" sz="500" b="1" dirty="0">
+                  <a:solidFill>
+                    <a:srgbClr val="FF0000"/>
+                  </a:solidFill>
+                </a:endParaRPr>
+              </a:p>
+            </p:txBody>
+          </p:sp>
+          <p:sp>
+            <p:nvSpPr>
+              <p:cNvPr id="18" name="TextBox 17"/>
+              <p:cNvSpPr txBox="1"/>
+              <p:nvPr/>
+            </p:nvSpPr>
+            <p:spPr>
+              <a:xfrm>
+                <a:off x="3872575" y="3293308"/>
+                <a:ext cx="304892" cy="169277"/>
+              </a:xfrm>
+              <a:prstGeom prst="rect">
+                <a:avLst/>
+              </a:prstGeom>
+              <a:noFill/>
+            </p:spPr>
+            <p:txBody>
+              <a:bodyPr wrap="none" rtlCol="0">
+                <a:spAutoFit/>
+              </a:bodyPr>
+              <a:lstStyle/>
+              <a:p>
+                <a:r>
+                  <a:rPr lang="en-US" sz="500" b="1" dirty="0" smtClean="0">
+                    <a:solidFill>
+                      <a:srgbClr val="FF0000"/>
+                    </a:solidFill>
+                  </a:rPr>
+                  <a:t>LEFT</a:t>
+                </a:r>
+                <a:endParaRPr lang="en-US" sz="500" b="1" dirty="0">
+                  <a:solidFill>
+                    <a:srgbClr val="FF0000"/>
+                  </a:solidFill>
+                </a:endParaRPr>
+              </a:p>
+            </p:txBody>
+          </p:sp>
+          <p:sp>
+            <p:nvSpPr>
+              <p:cNvPr id="19" name="TextBox 18"/>
+              <p:cNvSpPr txBox="1"/>
+              <p:nvPr/>
+            </p:nvSpPr>
+            <p:spPr>
+              <a:xfrm rot="5400000">
+                <a:off x="3770732" y="4404365"/>
+                <a:ext cx="322524" cy="169277"/>
+              </a:xfrm>
+              <a:prstGeom prst="rect">
+                <a:avLst/>
+              </a:prstGeom>
+              <a:noFill/>
+            </p:spPr>
+            <p:txBody>
+              <a:bodyPr wrap="none" rtlCol="0">
+                <a:spAutoFit/>
+              </a:bodyPr>
+              <a:lstStyle/>
+              <a:p>
+                <a:r>
+                  <a:rPr lang="en-US" sz="500" b="1" dirty="0" smtClean="0">
+                    <a:solidFill>
+                      <a:srgbClr val="FF0000"/>
+                    </a:solidFill>
+                  </a:rPr>
+                  <a:t>BATT</a:t>
+                </a:r>
+                <a:endParaRPr lang="en-US" sz="500" b="1" dirty="0">
+                  <a:solidFill>
+                    <a:srgbClr val="FF0000"/>
+                  </a:solidFill>
+                </a:endParaRPr>
+              </a:p>
+            </p:txBody>
+          </p:sp>
+          <p:sp>
+            <p:nvSpPr>
+              <p:cNvPr id="20" name="TextBox 19"/>
+              <p:cNvSpPr txBox="1"/>
+              <p:nvPr/>
+            </p:nvSpPr>
+            <p:spPr>
+              <a:xfrm>
+                <a:off x="3540486" y="5429893"/>
+                <a:ext cx="346570" cy="169277"/>
+              </a:xfrm>
+              <a:prstGeom prst="rect">
+                <a:avLst/>
+              </a:prstGeom>
+              <a:noFill/>
+            </p:spPr>
+            <p:txBody>
+              <a:bodyPr wrap="none" rtlCol="0">
+                <a:spAutoFit/>
+              </a:bodyPr>
+              <a:lstStyle/>
+              <a:p>
+                <a:r>
+                  <a:rPr lang="en-US" sz="500" b="1" dirty="0" smtClean="0">
+                    <a:solidFill>
+                      <a:srgbClr val="FF0000"/>
+                    </a:solidFill>
+                  </a:rPr>
+                  <a:t>RN-42</a:t>
+                </a:r>
+                <a:endParaRPr lang="en-US" sz="500" b="1" dirty="0">
+                  <a:solidFill>
+                    <a:srgbClr val="FF0000"/>
+                  </a:solidFill>
+                </a:endParaRPr>
+              </a:p>
+            </p:txBody>
+          </p:sp>
+          <p:sp>
+            <p:nvSpPr>
+              <p:cNvPr id="21" name="TextBox 20"/>
+              <p:cNvSpPr txBox="1"/>
+              <p:nvPr/>
+            </p:nvSpPr>
+            <p:spPr>
+              <a:xfrm rot="5400000">
+                <a:off x="3013598" y="5488554"/>
+                <a:ext cx="252633" cy="113877"/>
+              </a:xfrm>
+              <a:prstGeom prst="rect">
+                <a:avLst/>
+              </a:prstGeom>
+              <a:noFill/>
+            </p:spPr>
+            <p:txBody>
+              <a:bodyPr wrap="none" lIns="45720" tIns="18288" rIns="45720" bIns="18288" rtlCol="0">
+                <a:spAutoFit/>
+              </a:bodyPr>
+              <a:lstStyle/>
+              <a:p>
+                <a:r>
+                  <a:rPr lang="en-US" sz="500" b="1" dirty="0" smtClean="0">
+                    <a:solidFill>
+                      <a:srgbClr val="FF0000"/>
+                    </a:solidFill>
+                  </a:rPr>
+                  <a:t>AGND</a:t>
+                </a:r>
+                <a:endParaRPr lang="en-US" sz="500" b="1" dirty="0">
+                  <a:solidFill>
+                    <a:srgbClr val="FF0000"/>
+                  </a:solidFill>
+                </a:endParaRPr>
+              </a:p>
+            </p:txBody>
+          </p:sp>
+          <p:sp>
+            <p:nvSpPr>
+              <p:cNvPr id="22" name="TextBox 21"/>
+              <p:cNvSpPr txBox="1"/>
+              <p:nvPr/>
+            </p:nvSpPr>
+            <p:spPr>
+              <a:xfrm rot="5400000">
+                <a:off x="2769152" y="3921380"/>
+                <a:ext cx="285656" cy="169277"/>
+              </a:xfrm>
+              <a:prstGeom prst="rect">
+                <a:avLst/>
+              </a:prstGeom>
+              <a:noFill/>
+            </p:spPr>
+            <p:txBody>
+              <a:bodyPr wrap="none" rtlCol="0">
+                <a:spAutoFit/>
+              </a:bodyPr>
+              <a:lstStyle/>
+              <a:p>
+                <a:r>
+                  <a:rPr lang="en-US" sz="500" b="1" dirty="0" smtClean="0">
+                    <a:solidFill>
+                      <a:srgbClr val="FF0000"/>
+                    </a:solidFill>
+                  </a:rPr>
+                  <a:t>OFF</a:t>
+                </a:r>
+                <a:endParaRPr lang="en-US" sz="500" b="1" dirty="0">
+                  <a:solidFill>
+                    <a:srgbClr val="FF0000"/>
+                  </a:solidFill>
+                </a:endParaRPr>
+              </a:p>
+            </p:txBody>
+          </p:sp>
+          <p:sp>
+            <p:nvSpPr>
+              <p:cNvPr id="23" name="TextBox 22"/>
+              <p:cNvSpPr txBox="1"/>
+              <p:nvPr/>
+            </p:nvSpPr>
+            <p:spPr>
+              <a:xfrm rot="5400000">
+                <a:off x="2850411" y="5471881"/>
+                <a:ext cx="212559" cy="113877"/>
+              </a:xfrm>
+              <a:prstGeom prst="rect">
+                <a:avLst/>
+              </a:prstGeom>
+              <a:noFill/>
+            </p:spPr>
+            <p:txBody>
+              <a:bodyPr wrap="none" lIns="45720" tIns="18288" rIns="45720" bIns="18288" rtlCol="0">
+                <a:spAutoFit/>
+              </a:bodyPr>
+              <a:lstStyle/>
+              <a:p>
+                <a:r>
+                  <a:rPr lang="en-US" sz="500" b="1" dirty="0" smtClean="0">
+                    <a:solidFill>
+                      <a:srgbClr val="FF0000"/>
+                    </a:solidFill>
+                  </a:rPr>
+                  <a:t>3.3V</a:t>
+                </a:r>
+                <a:endParaRPr lang="en-US" sz="500" b="1" dirty="0">
+                  <a:solidFill>
+                    <a:srgbClr val="FF0000"/>
+                  </a:solidFill>
+                </a:endParaRPr>
+              </a:p>
+            </p:txBody>
+          </p:sp>
+          <p:sp>
+            <p:nvSpPr>
+              <p:cNvPr id="24" name="TextBox 23"/>
+              <p:cNvSpPr txBox="1"/>
+              <p:nvPr/>
+            </p:nvSpPr>
+            <p:spPr>
+              <a:xfrm>
+                <a:off x="2793565" y="5676327"/>
+                <a:ext cx="534121" cy="184666"/>
+              </a:xfrm>
+              <a:prstGeom prst="rect">
+                <a:avLst/>
+              </a:prstGeom>
+              <a:noFill/>
+            </p:spPr>
+            <p:txBody>
+              <a:bodyPr wrap="none" rtlCol="0">
+                <a:spAutoFit/>
+              </a:bodyPr>
+              <a:lstStyle/>
+              <a:p>
+                <a:r>
+                  <a:rPr lang="en-US" sz="600" b="1" dirty="0" smtClean="0">
+                    <a:solidFill>
+                      <a:srgbClr val="FF0000"/>
+                    </a:solidFill>
+                  </a:rPr>
+                  <a:t>TYMPAN A</a:t>
+                </a:r>
+                <a:endParaRPr lang="en-US" sz="600" b="1" dirty="0">
+                  <a:solidFill>
+                    <a:srgbClr val="FF0000"/>
+                  </a:solidFill>
+                </a:endParaRPr>
+              </a:p>
+            </p:txBody>
+          </p:sp>
+          <p:sp>
+            <p:nvSpPr>
+              <p:cNvPr id="27" name="TextBox 26"/>
+              <p:cNvSpPr txBox="1"/>
+              <p:nvPr/>
+            </p:nvSpPr>
+            <p:spPr>
+              <a:xfrm>
+                <a:off x="2953143" y="4840853"/>
+                <a:ext cx="212559" cy="113877"/>
+              </a:xfrm>
+              <a:prstGeom prst="rect">
+                <a:avLst/>
+              </a:prstGeom>
+              <a:noFill/>
+            </p:spPr>
+            <p:txBody>
+              <a:bodyPr wrap="none" lIns="45720" tIns="18288" rIns="45720" bIns="18288" rtlCol="0">
+                <a:spAutoFit/>
+              </a:bodyPr>
+              <a:lstStyle/>
+              <a:p>
+                <a:r>
+                  <a:rPr lang="en-US" sz="500" b="1" dirty="0" smtClean="0">
+                    <a:solidFill>
+                      <a:srgbClr val="FF0000"/>
+                    </a:solidFill>
+                  </a:rPr>
+                  <a:t>1.8V</a:t>
+                </a:r>
+                <a:endParaRPr lang="en-US" sz="500" b="1" dirty="0">
+                  <a:solidFill>
+                    <a:srgbClr val="FF0000"/>
+                  </a:solidFill>
+                </a:endParaRPr>
+              </a:p>
+            </p:txBody>
+          </p:sp>
+          <p:sp>
+            <p:nvSpPr>
+              <p:cNvPr id="28" name="TextBox 27"/>
+              <p:cNvSpPr txBox="1"/>
+              <p:nvPr/>
+            </p:nvSpPr>
+            <p:spPr>
+              <a:xfrm>
+                <a:off x="2953143" y="4935678"/>
+                <a:ext cx="239809" cy="113877"/>
+              </a:xfrm>
+              <a:prstGeom prst="rect">
+                <a:avLst/>
+              </a:prstGeom>
+              <a:noFill/>
+            </p:spPr>
+            <p:txBody>
+              <a:bodyPr wrap="none" lIns="45720" tIns="18288" rIns="45720" bIns="18288" rtlCol="0">
+                <a:spAutoFit/>
+              </a:bodyPr>
+              <a:lstStyle/>
+              <a:p>
+                <a:r>
+                  <a:rPr lang="en-US" sz="500" b="1" dirty="0" smtClean="0">
+                    <a:solidFill>
+                      <a:srgbClr val="FF0000"/>
+                    </a:solidFill>
+                  </a:rPr>
+                  <a:t>MISO</a:t>
+                </a:r>
+                <a:endParaRPr lang="en-US" sz="500" b="1" dirty="0">
+                  <a:solidFill>
+                    <a:srgbClr val="FF0000"/>
+                  </a:solidFill>
+                </a:endParaRPr>
+              </a:p>
+            </p:txBody>
+          </p:sp>
+          <p:sp>
+            <p:nvSpPr>
+              <p:cNvPr id="29" name="TextBox 28"/>
+              <p:cNvSpPr txBox="1"/>
+              <p:nvPr/>
+            </p:nvSpPr>
+            <p:spPr>
+              <a:xfrm>
+                <a:off x="2953143" y="5027046"/>
+                <a:ext cx="218971" cy="113877"/>
+              </a:xfrm>
+              <a:prstGeom prst="rect">
+                <a:avLst/>
+              </a:prstGeom>
+              <a:noFill/>
+            </p:spPr>
+            <p:txBody>
+              <a:bodyPr wrap="none" lIns="45720" tIns="18288" rIns="45720" bIns="18288" rtlCol="0">
+                <a:spAutoFit/>
+              </a:bodyPr>
+              <a:lstStyle/>
+              <a:p>
+                <a:r>
+                  <a:rPr lang="en-US" sz="500" b="1" dirty="0" smtClean="0">
+                    <a:solidFill>
+                      <a:srgbClr val="FF0000"/>
+                    </a:solidFill>
+                  </a:rPr>
+                  <a:t>SCLK</a:t>
+                </a:r>
+                <a:endParaRPr lang="en-US" sz="500" b="1" dirty="0">
+                  <a:solidFill>
+                    <a:srgbClr val="FF0000"/>
+                  </a:solidFill>
+                </a:endParaRPr>
+              </a:p>
+            </p:txBody>
+          </p:sp>
+          <p:sp>
+            <p:nvSpPr>
+              <p:cNvPr id="30" name="TextBox 29"/>
+              <p:cNvSpPr txBox="1"/>
+              <p:nvPr/>
+            </p:nvSpPr>
+            <p:spPr>
+              <a:xfrm>
+                <a:off x="2953143" y="5117325"/>
+                <a:ext cx="214161" cy="113877"/>
+              </a:xfrm>
+              <a:prstGeom prst="rect">
+                <a:avLst/>
+              </a:prstGeom>
+              <a:noFill/>
+            </p:spPr>
+            <p:txBody>
+              <a:bodyPr wrap="none" lIns="45720" tIns="18288" rIns="45720" bIns="18288" rtlCol="0">
+                <a:spAutoFit/>
+              </a:bodyPr>
+              <a:lstStyle/>
+              <a:p>
+                <a:r>
+                  <a:rPr lang="en-US" sz="500" b="1" dirty="0" smtClean="0">
+                    <a:solidFill>
+                      <a:srgbClr val="FF0000"/>
+                    </a:solidFill>
+                  </a:rPr>
+                  <a:t>GND</a:t>
+                </a:r>
+                <a:endParaRPr lang="en-US" sz="500" b="1" dirty="0">
+                  <a:solidFill>
+                    <a:srgbClr val="FF0000"/>
+                  </a:solidFill>
+                </a:endParaRPr>
+              </a:p>
+            </p:txBody>
+          </p:sp>
+          <p:sp>
+            <p:nvSpPr>
+              <p:cNvPr id="9" name="Oval 8"/>
+              <p:cNvSpPr/>
+              <p:nvPr/>
+            </p:nvSpPr>
+            <p:spPr>
+              <a:xfrm>
+                <a:off x="2779276" y="4101217"/>
+                <a:ext cx="472625" cy="637466"/>
+              </a:xfrm>
+              <a:prstGeom prst="ellipse">
+                <a:avLst/>
+              </a:prstGeom>
+              <a:noFill/>
+              <a:ln w="12700">
+                <a:solidFill>
+                  <a:srgbClr val="FF0000"/>
+                </a:solidFill>
+                <a:prstDash val="sysDash"/>
+              </a:ln>
+            </p:spPr>
+            <p:style>
+              <a:lnRef idx="2">
+                <a:schemeClr val="accent1">
+                  <a:shade val="50000"/>
+                </a:schemeClr>
+              </a:lnRef>
+              <a:fillRef idx="1">
+                <a:schemeClr val="accent1"/>
+              </a:fillRef>
+              <a:effectRef idx="0">
+                <a:schemeClr val="accent1"/>
+              </a:effectRef>
+              <a:fontRef idx="minor">
+                <a:schemeClr val="lt1"/>
+              </a:fontRef>
+            </p:style>
+            <p:txBody>
+              <a:bodyPr rtlCol="0" anchor="ctr"/>
+              <a:lstStyle/>
+              <a:p>
+                <a:pPr algn="ctr"/>
+                <a:endParaRPr lang="en-US"/>
+              </a:p>
+            </p:txBody>
+          </p:sp>
+          <p:grpSp>
+            <p:nvGrpSpPr>
+              <p:cNvPr id="43" name="Group 42"/>
+              <p:cNvGrpSpPr/>
+              <p:nvPr/>
+            </p:nvGrpSpPr>
+            <p:grpSpPr>
+              <a:xfrm>
+                <a:off x="1128119" y="2890931"/>
+                <a:ext cx="1005840" cy="1163991"/>
+                <a:chOff x="877940" y="3555978"/>
+                <a:chExt cx="1005840" cy="1163991"/>
+              </a:xfrm>
+            </p:grpSpPr>
+            <p:pic>
+              <p:nvPicPr>
+                <p:cNvPr id="34" name="Picture 3"/>
+                <p:cNvPicPr>
+                  <a:picLocks noChangeAspect="1" noChangeArrowheads="1"/>
+                </p:cNvPicPr>
+                <p:nvPr/>
+              </p:nvPicPr>
+              <p:blipFill rotWithShape="1">
+                <a:blip r:embed="rId6">
+                  <a:extLst>
+                    <a:ext uri="{BEBA8EAE-BF5A-486C-A8C5-ECC9F3942E4B}">
+                      <a14:imgProps xmlns:a14="http://schemas.microsoft.com/office/drawing/2010/main">
+                        <a14:imgLayer r:embed="rId7">
+                          <a14:imgEffect>
+                            <a14:saturation sat="0"/>
+                          </a14:imgEffect>
+                        </a14:imgLayer>
+                      </a14:imgProps>
+                    </a:ext>
+                    <a:ext uri="{28A0092B-C50C-407E-A947-70E740481C1C}">
+                      <a14:useLocalDpi xmlns:a14="http://schemas.microsoft.com/office/drawing/2010/main" val="0"/>
+                    </a:ext>
+                  </a:extLst>
+                </a:blip>
+                <a:srcRect l="36924" t="46848" r="55936" b="45406"/>
+                <a:stretch/>
+              </p:blipFill>
+              <p:spPr bwMode="auto">
+                <a:xfrm>
+                  <a:off x="877940" y="3624894"/>
+                  <a:ext cx="1005840" cy="1047905"/>
+                </a:xfrm>
+                <a:prstGeom prst="rect">
+                  <a:avLst/>
+                </a:prstGeom>
+                <a:noFill/>
+                <a:ln>
+                  <a:noFill/>
+                </a:ln>
+                <a:extLst>
+                  <a:ext uri="{909E8E84-426E-40DD-AFC4-6F175D3DCCD1}">
+                    <a14:hiddenFill xmlns:a14="http://schemas.microsoft.com/office/drawing/2010/main">
+                      <a:solidFill>
+                        <a:schemeClr val="accent1"/>
+                      </a:solidFill>
+                    </a14:hiddenFill>
+                  </a:ext>
+                  <a:ext uri="{91240B29-F687-4F45-9708-019B960494DF}">
+                    <a14:hiddenLine xmlns:a14="http://schemas.microsoft.com/office/drawing/2010/main" w="9525">
+                      <a:solidFill>
+                        <a:schemeClr val="tx1"/>
+                      </a:solidFill>
+                      <a:miter lim="800000"/>
+                      <a:headEnd/>
+                      <a:tailEnd/>
+                    </a14:hiddenLine>
+                  </a:ext>
+                </a:extLst>
+              </p:spPr>
+            </p:pic>
+            <p:grpSp>
+              <p:nvGrpSpPr>
+                <p:cNvPr id="36" name="Group 35"/>
+                <p:cNvGrpSpPr/>
+                <p:nvPr/>
+              </p:nvGrpSpPr>
+              <p:grpSpPr>
+                <a:xfrm>
+                  <a:off x="1516380" y="3813117"/>
+                  <a:ext cx="352160" cy="162083"/>
+                  <a:chOff x="1516380" y="3813117"/>
+                  <a:chExt cx="352160" cy="162083"/>
+                </a:xfrm>
+              </p:grpSpPr>
+              <p:cxnSp>
+                <p:nvCxnSpPr>
+                  <p:cNvPr id="35" name="Straight Connector 34"/>
+                  <p:cNvCxnSpPr/>
+                  <p:nvPr/>
+                </p:nvCxnSpPr>
+                <p:spPr>
+                  <a:xfrm flipH="1">
+                    <a:off x="1516380" y="3813117"/>
+                    <a:ext cx="352160" cy="162083"/>
+                  </a:xfrm>
+                  <a:prstGeom prst="line">
+                    <a:avLst/>
+                  </a:prstGeom>
+                  <a:ln w="19050">
+                    <a:solidFill>
+                      <a:srgbClr val="FF0000"/>
+                    </a:solidFill>
+                  </a:ln>
+                </p:spPr>
+                <p:style>
+                  <a:lnRef idx="1">
+                    <a:schemeClr val="accent1"/>
+                  </a:lnRef>
+                  <a:fillRef idx="0">
+                    <a:schemeClr val="accent1"/>
+                  </a:fillRef>
+                  <a:effectRef idx="0">
+                    <a:schemeClr val="accent1"/>
+                  </a:effectRef>
+                  <a:fontRef idx="minor">
+                    <a:schemeClr val="tx1"/>
+                  </a:fontRef>
+                </p:style>
+              </p:cxnSp>
+              <p:cxnSp>
+                <p:nvCxnSpPr>
+                  <p:cNvPr id="38" name="Straight Connector 37"/>
+                  <p:cNvCxnSpPr/>
+                  <p:nvPr/>
+                </p:nvCxnSpPr>
+                <p:spPr>
+                  <a:xfrm>
+                    <a:off x="1516380" y="3813117"/>
+                    <a:ext cx="352160" cy="162083"/>
+                  </a:xfrm>
+                  <a:prstGeom prst="line">
+                    <a:avLst/>
+                  </a:prstGeom>
+                  <a:ln w="19050">
+                    <a:solidFill>
+                      <a:srgbClr val="FF0000"/>
+                    </a:solidFill>
+                  </a:ln>
+                </p:spPr>
+                <p:style>
+                  <a:lnRef idx="1">
+                    <a:schemeClr val="accent1"/>
+                  </a:lnRef>
+                  <a:fillRef idx="0">
+                    <a:schemeClr val="accent1"/>
+                  </a:fillRef>
+                  <a:effectRef idx="0">
+                    <a:schemeClr val="accent1"/>
+                  </a:effectRef>
+                  <a:fontRef idx="minor">
+                    <a:schemeClr val="tx1"/>
+                  </a:fontRef>
+                </p:style>
+              </p:cxnSp>
+            </p:grpSp>
+            <p:grpSp>
+              <p:nvGrpSpPr>
+                <p:cNvPr id="40" name="Group 39"/>
+                <p:cNvGrpSpPr/>
+                <p:nvPr/>
+              </p:nvGrpSpPr>
+              <p:grpSpPr>
+                <a:xfrm>
+                  <a:off x="1516380" y="4333270"/>
+                  <a:ext cx="352160" cy="162083"/>
+                  <a:chOff x="1516380" y="3813117"/>
+                  <a:chExt cx="352160" cy="162083"/>
+                </a:xfrm>
+              </p:grpSpPr>
+              <p:cxnSp>
+                <p:nvCxnSpPr>
+                  <p:cNvPr id="41" name="Straight Connector 40"/>
+                  <p:cNvCxnSpPr/>
+                  <p:nvPr/>
+                </p:nvCxnSpPr>
+                <p:spPr>
+                  <a:xfrm flipH="1">
+                    <a:off x="1516380" y="3813117"/>
+                    <a:ext cx="352160" cy="162083"/>
+                  </a:xfrm>
+                  <a:prstGeom prst="line">
+                    <a:avLst/>
+                  </a:prstGeom>
+                  <a:ln w="19050">
+                    <a:solidFill>
+                      <a:srgbClr val="FF0000"/>
+                    </a:solidFill>
+                  </a:ln>
+                </p:spPr>
+                <p:style>
+                  <a:lnRef idx="1">
+                    <a:schemeClr val="accent1"/>
+                  </a:lnRef>
+                  <a:fillRef idx="0">
+                    <a:schemeClr val="accent1"/>
+                  </a:fillRef>
+                  <a:effectRef idx="0">
+                    <a:schemeClr val="accent1"/>
+                  </a:effectRef>
+                  <a:fontRef idx="minor">
+                    <a:schemeClr val="tx1"/>
+                  </a:fontRef>
+                </p:style>
+              </p:cxnSp>
+              <p:cxnSp>
+                <p:nvCxnSpPr>
+                  <p:cNvPr id="42" name="Straight Connector 41"/>
+                  <p:cNvCxnSpPr/>
+                  <p:nvPr/>
+                </p:nvCxnSpPr>
+                <p:spPr>
+                  <a:xfrm>
+                    <a:off x="1516380" y="3813117"/>
+                    <a:ext cx="352160" cy="162083"/>
+                  </a:xfrm>
+                  <a:prstGeom prst="line">
+                    <a:avLst/>
+                  </a:prstGeom>
+                  <a:ln w="19050">
+                    <a:solidFill>
+                      <a:srgbClr val="FF0000"/>
+                    </a:solidFill>
+                  </a:ln>
+                </p:spPr>
+                <p:style>
+                  <a:lnRef idx="1">
+                    <a:schemeClr val="accent1"/>
+                  </a:lnRef>
+                  <a:fillRef idx="0">
+                    <a:schemeClr val="accent1"/>
+                  </a:fillRef>
+                  <a:effectRef idx="0">
+                    <a:schemeClr val="accent1"/>
+                  </a:effectRef>
+                  <a:fontRef idx="minor">
+                    <a:schemeClr val="tx1"/>
+                  </a:fontRef>
+                </p:style>
+              </p:cxnSp>
+            </p:grpSp>
+            <p:sp>
+              <p:nvSpPr>
+                <p:cNvPr id="39" name="Freeform 38"/>
+                <p:cNvSpPr/>
+                <p:nvPr/>
+              </p:nvSpPr>
+              <p:spPr>
+                <a:xfrm>
+                  <a:off x="1242060" y="3555978"/>
+                  <a:ext cx="441960" cy="200682"/>
+                </a:xfrm>
+                <a:custGeom>
+                  <a:avLst/>
+                  <a:gdLst>
+                    <a:gd name="connsiteX0" fmla="*/ 0 w 441960"/>
+                    <a:gd name="connsiteY0" fmla="*/ 130529 h 191489"/>
+                    <a:gd name="connsiteX1" fmla="*/ 342900 w 441960"/>
+                    <a:gd name="connsiteY1" fmla="*/ 989 h 191489"/>
+                    <a:gd name="connsiteX2" fmla="*/ 441960 w 441960"/>
+                    <a:gd name="connsiteY2" fmla="*/ 191489 h 191489"/>
+                    <a:gd name="connsiteX0" fmla="*/ 0 w 441960"/>
+                    <a:gd name="connsiteY0" fmla="*/ 139722 h 200682"/>
+                    <a:gd name="connsiteX1" fmla="*/ 342900 w 441960"/>
+                    <a:gd name="connsiteY1" fmla="*/ 10182 h 200682"/>
+                    <a:gd name="connsiteX2" fmla="*/ 441960 w 441960"/>
+                    <a:gd name="connsiteY2" fmla="*/ 200682 h 200682"/>
+                  </a:gdLst>
+                  <a:ahLst/>
+                  <a:cxnLst>
+                    <a:cxn ang="0">
+                      <a:pos x="connsiteX0" y="connsiteY0"/>
+                    </a:cxn>
+                    <a:cxn ang="0">
+                      <a:pos x="connsiteX1" y="connsiteY1"/>
+                    </a:cxn>
+                    <a:cxn ang="0">
+                      <a:pos x="connsiteX2" y="connsiteY2"/>
+                    </a:cxn>
+                  </a:cxnLst>
+                  <a:rect l="l" t="t" r="r" b="b"/>
+                  <a:pathLst>
+                    <a:path w="441960" h="200682">
+                      <a:moveTo>
+                        <a:pt x="0" y="139722"/>
+                      </a:moveTo>
+                      <a:cubicBezTo>
+                        <a:pt x="96520" y="-36808"/>
+                        <a:pt x="269240" y="22"/>
+                        <a:pt x="342900" y="10182"/>
+                      </a:cubicBezTo>
+                      <a:cubicBezTo>
+                        <a:pt x="416560" y="20342"/>
+                        <a:pt x="429260" y="110512"/>
+                        <a:pt x="441960" y="200682"/>
+                      </a:cubicBezTo>
+                    </a:path>
+                  </a:pathLst>
+                </a:custGeom>
+                <a:noFill/>
+                <a:ln>
+                  <a:solidFill>
+                    <a:srgbClr val="FF0000"/>
+                  </a:solidFill>
+                  <a:headEnd type="none" w="med" len="med"/>
+                  <a:tailEnd type="triangle" w="med" len="med"/>
+                </a:ln>
+              </p:spPr>
+              <p:style>
+                <a:lnRef idx="2">
+                  <a:schemeClr val="accent1">
+                    <a:shade val="50000"/>
+                  </a:schemeClr>
+                </a:lnRef>
+                <a:fillRef idx="1">
+                  <a:schemeClr val="accent1"/>
+                </a:fillRef>
+                <a:effectRef idx="0">
+                  <a:schemeClr val="accent1"/>
+                </a:effectRef>
+                <a:fontRef idx="minor">
+                  <a:schemeClr val="lt1"/>
+                </a:fontRef>
+              </p:style>
+              <p:txBody>
+                <a:bodyPr rtlCol="0" anchor="ctr"/>
+                <a:lstStyle/>
+                <a:p>
+                  <a:pPr algn="ctr"/>
+                  <a:endParaRPr lang="en-US"/>
+                </a:p>
+              </p:txBody>
+            </p:sp>
+            <p:sp>
+              <p:nvSpPr>
+                <p:cNvPr id="45" name="Freeform 44"/>
+                <p:cNvSpPr/>
+                <p:nvPr/>
+              </p:nvSpPr>
+              <p:spPr>
+                <a:xfrm flipV="1">
+                  <a:off x="1257300" y="4519287"/>
+                  <a:ext cx="441960" cy="200682"/>
+                </a:xfrm>
+                <a:custGeom>
+                  <a:avLst/>
+                  <a:gdLst>
+                    <a:gd name="connsiteX0" fmla="*/ 0 w 441960"/>
+                    <a:gd name="connsiteY0" fmla="*/ 130529 h 191489"/>
+                    <a:gd name="connsiteX1" fmla="*/ 342900 w 441960"/>
+                    <a:gd name="connsiteY1" fmla="*/ 989 h 191489"/>
+                    <a:gd name="connsiteX2" fmla="*/ 441960 w 441960"/>
+                    <a:gd name="connsiteY2" fmla="*/ 191489 h 191489"/>
+                    <a:gd name="connsiteX0" fmla="*/ 0 w 441960"/>
+                    <a:gd name="connsiteY0" fmla="*/ 139722 h 200682"/>
+                    <a:gd name="connsiteX1" fmla="*/ 342900 w 441960"/>
+                    <a:gd name="connsiteY1" fmla="*/ 10182 h 200682"/>
+                    <a:gd name="connsiteX2" fmla="*/ 441960 w 441960"/>
+                    <a:gd name="connsiteY2" fmla="*/ 200682 h 200682"/>
+                  </a:gdLst>
+                  <a:ahLst/>
+                  <a:cxnLst>
+                    <a:cxn ang="0">
+                      <a:pos x="connsiteX0" y="connsiteY0"/>
+                    </a:cxn>
+                    <a:cxn ang="0">
+                      <a:pos x="connsiteX1" y="connsiteY1"/>
+                    </a:cxn>
+                    <a:cxn ang="0">
+                      <a:pos x="connsiteX2" y="connsiteY2"/>
+                    </a:cxn>
+                  </a:cxnLst>
+                  <a:rect l="l" t="t" r="r" b="b"/>
+                  <a:pathLst>
+                    <a:path w="441960" h="200682">
+                      <a:moveTo>
+                        <a:pt x="0" y="139722"/>
+                      </a:moveTo>
+                      <a:cubicBezTo>
+                        <a:pt x="96520" y="-36808"/>
+                        <a:pt x="269240" y="22"/>
+                        <a:pt x="342900" y="10182"/>
+                      </a:cubicBezTo>
+                      <a:cubicBezTo>
+                        <a:pt x="416560" y="20342"/>
+                        <a:pt x="429260" y="110512"/>
+                        <a:pt x="441960" y="200682"/>
+                      </a:cubicBezTo>
+                    </a:path>
+                  </a:pathLst>
+                </a:custGeom>
+                <a:noFill/>
+                <a:ln>
+                  <a:solidFill>
+                    <a:srgbClr val="FF0000"/>
+                  </a:solidFill>
+                  <a:headEnd type="none" w="med" len="med"/>
+                  <a:tailEnd type="triangle" w="med" len="med"/>
+                </a:ln>
+              </p:spPr>
+              <p:style>
+                <a:lnRef idx="2">
+                  <a:schemeClr val="accent1">
+                    <a:shade val="50000"/>
+                  </a:schemeClr>
+                </a:lnRef>
+                <a:fillRef idx="1">
+                  <a:schemeClr val="accent1"/>
+                </a:fillRef>
+                <a:effectRef idx="0">
+                  <a:schemeClr val="accent1"/>
+                </a:effectRef>
+                <a:fontRef idx="minor">
+                  <a:schemeClr val="lt1"/>
+                </a:fontRef>
+              </p:style>
+              <p:txBody>
+                <a:bodyPr rtlCol="0" anchor="ctr"/>
+                <a:lstStyle/>
+                <a:p>
+                  <a:pPr algn="ctr"/>
+                  <a:endParaRPr lang="en-US"/>
+                </a:p>
+              </p:txBody>
+            </p:sp>
+          </p:grpSp>
+          <p:cxnSp>
+            <p:nvCxnSpPr>
+              <p:cNvPr id="46" name="Straight Arrow Connector 45"/>
+              <p:cNvCxnSpPr>
+                <a:stCxn id="9" idx="1"/>
+              </p:cNvCxnSpPr>
+              <p:nvPr/>
+            </p:nvCxnSpPr>
+            <p:spPr>
+              <a:xfrm flipH="1" flipV="1">
+                <a:off x="2247900" y="3668223"/>
+                <a:ext cx="600590" cy="526349"/>
+              </a:xfrm>
+              <a:prstGeom prst="straightConnector1">
+                <a:avLst/>
+              </a:prstGeom>
+              <a:ln w="38100">
+                <a:solidFill>
+                  <a:srgbClr val="FF0000"/>
+                </a:solidFill>
+                <a:tailEnd type="arrow"/>
+              </a:ln>
+            </p:spPr>
+            <p:style>
+              <a:lnRef idx="1">
+                <a:schemeClr val="accent1"/>
+              </a:lnRef>
+              <a:fillRef idx="0">
+                <a:schemeClr val="accent1"/>
+              </a:fillRef>
+              <a:effectRef idx="0">
+                <a:schemeClr val="accent1"/>
+              </a:effectRef>
+              <a:fontRef idx="minor">
+                <a:schemeClr val="tx1"/>
+              </a:fontRef>
+            </p:style>
+          </p:cxnSp>
+          <p:cxnSp>
+            <p:nvCxnSpPr>
+              <p:cNvPr id="60" name="Straight Arrow Connector 59"/>
+              <p:cNvCxnSpPr/>
+              <p:nvPr/>
+            </p:nvCxnSpPr>
+            <p:spPr>
+              <a:xfrm>
+                <a:off x="1399518" y="3977886"/>
+                <a:ext cx="185442" cy="449967"/>
+              </a:xfrm>
+              <a:prstGeom prst="straightConnector1">
+                <a:avLst/>
+              </a:prstGeom>
+              <a:ln w="38100">
+                <a:solidFill>
+                  <a:srgbClr val="FF0000"/>
+                </a:solidFill>
+                <a:tailEnd type="arrow"/>
+              </a:ln>
+            </p:spPr>
+            <p:style>
+              <a:lnRef idx="1">
+                <a:schemeClr val="accent1"/>
+              </a:lnRef>
+              <a:fillRef idx="0">
+                <a:schemeClr val="accent1"/>
+              </a:fillRef>
+              <a:effectRef idx="0">
+                <a:schemeClr val="accent1"/>
+              </a:effectRef>
+              <a:fontRef idx="minor">
+                <a:schemeClr val="tx1"/>
+              </a:fontRef>
+            </p:style>
+          </p:cxnSp>
+          <p:pic>
+            <p:nvPicPr>
+              <p:cNvPr id="1028" name="Picture 4"/>
+              <p:cNvPicPr>
+                <a:picLocks noChangeAspect="1" noChangeArrowheads="1"/>
+              </p:cNvPicPr>
+              <p:nvPr/>
+            </p:nvPicPr>
+            <p:blipFill>
+              <a:blip r:embed="rId8">
+                <a:extLst>
+                  <a:ext uri="{28A0092B-C50C-407E-A947-70E740481C1C}">
+                    <a14:useLocalDpi xmlns:a14="http://schemas.microsoft.com/office/drawing/2010/main" val="0"/>
+                  </a:ext>
+                </a:extLst>
+              </a:blip>
+              <a:srcRect/>
+              <a:stretch>
+                <a:fillRect/>
+              </a:stretch>
+            </p:blipFill>
+            <p:spPr bwMode="auto">
+              <a:xfrm>
+                <a:off x="1162051" y="4641907"/>
+                <a:ext cx="1023937" cy="1914525"/>
+              </a:xfrm>
+              <a:prstGeom prst="rect">
+                <a:avLst/>
+              </a:prstGeom>
+              <a:noFill/>
+              <a:ln>
+                <a:noFill/>
+              </a:ln>
+              <a:effectLst/>
+              <a:extLst>
+                <a:ext uri="{909E8E84-426E-40DD-AFC4-6F175D3DCCD1}">
+                  <a14:hiddenFill xmlns:a14="http://schemas.microsoft.com/office/drawing/2010/main">
+                    <a:solidFill>
+                      <a:schemeClr val="accent1"/>
+                    </a:solidFill>
+                  </a14:hiddenFill>
+                </a:ext>
+                <a:ext uri="{91240B29-F687-4F45-9708-019B960494DF}">
+                  <a14:hiddenLine xmlns:a14="http://schemas.microsoft.com/office/drawing/2010/main" w="9525">
+                    <a:solidFill>
+                      <a:schemeClr val="tx1"/>
+                    </a:solidFill>
+                    <a:miter lim="800000"/>
+                    <a:headEnd/>
+                    <a:tailEnd/>
+                  </a14:hiddenLine>
+                </a:ext>
+                <a:ext uri="{AF507438-7753-43E0-B8FC-AC1667EBCBE1}">
+                  <a14:hiddenEffects xmlns:a14="http://schemas.microsoft.com/office/drawing/2010/main">
+                    <a:effectLst>
+                      <a:outerShdw dist="35921" dir="2700000" algn="ctr" rotWithShape="0">
+                        <a:schemeClr val="bg2"/>
+                      </a:outerShdw>
+                    </a:effectLst>
+                  </a14:hiddenEffects>
+                </a:ext>
+              </a:extLst>
+            </p:spPr>
+          </p:pic>
+          <p:sp>
+            <p:nvSpPr>
+              <p:cNvPr id="73" name="TextBox 72"/>
+              <p:cNvSpPr txBox="1"/>
+              <p:nvPr/>
+            </p:nvSpPr>
+            <p:spPr>
+              <a:xfrm>
+                <a:off x="1782493" y="4652914"/>
+                <a:ext cx="335348" cy="307777"/>
+              </a:xfrm>
+              <a:prstGeom prst="rect">
+                <a:avLst/>
+              </a:prstGeom>
+              <a:noFill/>
+            </p:spPr>
+            <p:txBody>
+              <a:bodyPr wrap="none" rtlCol="0">
+                <a:spAutoFit/>
+              </a:bodyPr>
+              <a:lstStyle/>
+              <a:p>
+                <a:r>
+                  <a:rPr lang="en-US" sz="1400" b="1" dirty="0" smtClean="0">
+                    <a:solidFill>
+                      <a:srgbClr val="FF0000"/>
+                    </a:solidFill>
+                  </a:rPr>
+                  <a:t>J7</a:t>
+                </a:r>
+                <a:endParaRPr lang="en-US" sz="1400" b="1" dirty="0">
+                  <a:solidFill>
+                    <a:srgbClr val="FF0000"/>
+                  </a:solidFill>
+                </a:endParaRPr>
+              </a:p>
+            </p:txBody>
+          </p:sp>
+          <p:sp>
+            <p:nvSpPr>
+              <p:cNvPr id="74" name="TextBox 73"/>
+              <p:cNvSpPr txBox="1"/>
+              <p:nvPr/>
+            </p:nvSpPr>
+            <p:spPr>
+              <a:xfrm>
+                <a:off x="1782493" y="5250998"/>
+                <a:ext cx="335348" cy="307777"/>
+              </a:xfrm>
+              <a:prstGeom prst="rect">
+                <a:avLst/>
+              </a:prstGeom>
+              <a:noFill/>
+            </p:spPr>
+            <p:txBody>
+              <a:bodyPr wrap="none" rtlCol="0">
+                <a:spAutoFit/>
+              </a:bodyPr>
+              <a:lstStyle/>
+              <a:p>
+                <a:r>
+                  <a:rPr lang="en-US" sz="1400" b="1" dirty="0" smtClean="0">
+                    <a:solidFill>
+                      <a:srgbClr val="FF0000"/>
+                    </a:solidFill>
+                  </a:rPr>
+                  <a:t>J8</a:t>
+                </a:r>
+                <a:endParaRPr lang="en-US" sz="1400" b="1" dirty="0">
+                  <a:solidFill>
+                    <a:srgbClr val="FF0000"/>
+                  </a:solidFill>
+                </a:endParaRPr>
+              </a:p>
+            </p:txBody>
+          </p:sp>
+          <p:sp>
+            <p:nvSpPr>
+              <p:cNvPr id="75" name="TextBox 74"/>
+              <p:cNvSpPr txBox="1"/>
+              <p:nvPr/>
+            </p:nvSpPr>
+            <p:spPr>
+              <a:xfrm>
+                <a:off x="1782493" y="5608612"/>
+                <a:ext cx="335348" cy="307777"/>
+              </a:xfrm>
+              <a:prstGeom prst="rect">
+                <a:avLst/>
+              </a:prstGeom>
+              <a:noFill/>
+            </p:spPr>
+            <p:txBody>
+              <a:bodyPr wrap="none" rtlCol="0">
+                <a:spAutoFit/>
+              </a:bodyPr>
+              <a:lstStyle/>
+              <a:p>
+                <a:r>
+                  <a:rPr lang="en-US" sz="1400" b="1" dirty="0" smtClean="0">
+                    <a:solidFill>
+                      <a:srgbClr val="FF0000"/>
+                    </a:solidFill>
+                  </a:rPr>
+                  <a:t>J9</a:t>
+                </a:r>
+                <a:endParaRPr lang="en-US" sz="1400" b="1" dirty="0">
+                  <a:solidFill>
+                    <a:srgbClr val="FF0000"/>
+                  </a:solidFill>
+                </a:endParaRPr>
+              </a:p>
+            </p:txBody>
+          </p:sp>
+          <p:sp>
+            <p:nvSpPr>
+              <p:cNvPr id="76" name="TextBox 75"/>
+              <p:cNvSpPr txBox="1"/>
+              <p:nvPr/>
+            </p:nvSpPr>
+            <p:spPr>
+              <a:xfrm>
+                <a:off x="1782493" y="6223172"/>
+                <a:ext cx="426720" cy="307777"/>
+              </a:xfrm>
+              <a:prstGeom prst="rect">
+                <a:avLst/>
+              </a:prstGeom>
+              <a:noFill/>
+            </p:spPr>
+            <p:txBody>
+              <a:bodyPr wrap="none" rtlCol="0">
+                <a:spAutoFit/>
+              </a:bodyPr>
+              <a:lstStyle/>
+              <a:p>
+                <a:r>
+                  <a:rPr lang="en-US" sz="1400" b="1" dirty="0" smtClean="0">
+                    <a:solidFill>
+                      <a:srgbClr val="FF0000"/>
+                    </a:solidFill>
+                  </a:rPr>
+                  <a:t>J11</a:t>
+                </a:r>
+                <a:endParaRPr lang="en-US" sz="1400" b="1" dirty="0">
+                  <a:solidFill>
+                    <a:srgbClr val="FF0000"/>
+                  </a:solidFill>
+                </a:endParaRPr>
+              </a:p>
+            </p:txBody>
+          </p:sp>
+          <p:sp>
+            <p:nvSpPr>
+              <p:cNvPr id="77" name="TextBox 76"/>
+              <p:cNvSpPr txBox="1"/>
+              <p:nvPr/>
+            </p:nvSpPr>
+            <p:spPr>
+              <a:xfrm>
+                <a:off x="1148334" y="4575943"/>
+                <a:ext cx="736099" cy="307777"/>
+              </a:xfrm>
+              <a:prstGeom prst="rect">
+                <a:avLst/>
+              </a:prstGeom>
+              <a:noFill/>
+            </p:spPr>
+            <p:txBody>
+              <a:bodyPr wrap="none" rtlCol="0">
+                <a:spAutoFit/>
+              </a:bodyPr>
+              <a:lstStyle/>
+              <a:p>
+                <a:pPr algn="ctr"/>
+                <a:r>
+                  <a:rPr lang="en-US" sz="1400" b="1" dirty="0" smtClean="0">
+                    <a:solidFill>
+                      <a:srgbClr val="FF0000"/>
+                    </a:solidFill>
+                  </a:rPr>
+                  <a:t>IN1 L/R</a:t>
+                </a:r>
+                <a:endParaRPr lang="en-US" sz="1400" b="1" dirty="0">
+                  <a:solidFill>
+                    <a:srgbClr val="FF0000"/>
+                  </a:solidFill>
+                </a:endParaRPr>
+              </a:p>
+            </p:txBody>
+          </p:sp>
+          <p:sp>
+            <p:nvSpPr>
+              <p:cNvPr id="79" name="TextBox 78"/>
+              <p:cNvSpPr txBox="1"/>
+              <p:nvPr/>
+            </p:nvSpPr>
+            <p:spPr>
+              <a:xfrm>
+                <a:off x="1180362" y="5530197"/>
+                <a:ext cx="672043" cy="307777"/>
+              </a:xfrm>
+              <a:prstGeom prst="rect">
+                <a:avLst/>
+              </a:prstGeom>
+              <a:noFill/>
+            </p:spPr>
+            <p:txBody>
+              <a:bodyPr wrap="none" rtlCol="0">
+                <a:spAutoFit/>
+              </a:bodyPr>
+              <a:lstStyle/>
+              <a:p>
+                <a:pPr algn="ctr"/>
+                <a:r>
+                  <a:rPr lang="en-US" sz="1400" b="1" dirty="0" smtClean="0">
+                    <a:solidFill>
+                      <a:srgbClr val="FF0000"/>
+                    </a:solidFill>
+                  </a:rPr>
+                  <a:t>LO L/R</a:t>
+                </a:r>
+                <a:endParaRPr lang="en-US" sz="1400" b="1" dirty="0">
+                  <a:solidFill>
+                    <a:srgbClr val="FF0000"/>
+                  </a:solidFill>
+                </a:endParaRPr>
+              </a:p>
+            </p:txBody>
+          </p:sp>
+          <p:cxnSp>
+            <p:nvCxnSpPr>
+              <p:cNvPr id="85" name="Straight Arrow Connector 84"/>
+              <p:cNvCxnSpPr/>
+              <p:nvPr/>
+            </p:nvCxnSpPr>
+            <p:spPr>
+              <a:xfrm flipV="1">
+                <a:off x="2341836" y="4334091"/>
+                <a:ext cx="477966" cy="615188"/>
+              </a:xfrm>
+              <a:prstGeom prst="straightConnector1">
+                <a:avLst/>
+              </a:prstGeom>
+              <a:ln w="38100">
+                <a:solidFill>
+                  <a:srgbClr val="FF0000"/>
+                </a:solidFill>
+                <a:tailEnd type="arrow"/>
+              </a:ln>
+            </p:spPr>
+            <p:style>
+              <a:lnRef idx="1">
+                <a:schemeClr val="accent1"/>
+              </a:lnRef>
+              <a:fillRef idx="0">
+                <a:schemeClr val="accent1"/>
+              </a:fillRef>
+              <a:effectRef idx="0">
+                <a:schemeClr val="accent1"/>
+              </a:effectRef>
+              <a:fontRef idx="minor">
+                <a:schemeClr val="tx1"/>
+              </a:fontRef>
+            </p:style>
+          </p:cxnSp>
+          <p:cxnSp>
+            <p:nvCxnSpPr>
+              <p:cNvPr id="87" name="Straight Arrow Connector 86"/>
+              <p:cNvCxnSpPr/>
+              <p:nvPr/>
+            </p:nvCxnSpPr>
+            <p:spPr>
+              <a:xfrm flipV="1">
+                <a:off x="2185988" y="4656616"/>
+                <a:ext cx="641353" cy="1175536"/>
+              </a:xfrm>
+              <a:prstGeom prst="straightConnector1">
+                <a:avLst/>
+              </a:prstGeom>
+              <a:ln w="38100">
+                <a:solidFill>
+                  <a:srgbClr val="FF0000"/>
+                </a:solidFill>
+                <a:tailEnd type="arrow"/>
+              </a:ln>
+            </p:spPr>
+            <p:style>
+              <a:lnRef idx="1">
+                <a:schemeClr val="accent1"/>
+              </a:lnRef>
+              <a:fillRef idx="0">
+                <a:schemeClr val="accent1"/>
+              </a:fillRef>
+              <a:effectRef idx="0">
+                <a:schemeClr val="accent1"/>
+              </a:effectRef>
+              <a:fontRef idx="minor">
+                <a:schemeClr val="tx1"/>
+              </a:fontRef>
+            </p:style>
+          </p:cxnSp>
+          <p:sp>
+            <p:nvSpPr>
+              <p:cNvPr id="89" name="TextBox 88"/>
+              <p:cNvSpPr txBox="1"/>
+              <p:nvPr/>
+            </p:nvSpPr>
+            <p:spPr>
+              <a:xfrm>
+                <a:off x="5384950" y="5754072"/>
+                <a:ext cx="705642" cy="230832"/>
+              </a:xfrm>
+              <a:prstGeom prst="rect">
+                <a:avLst/>
+              </a:prstGeom>
+              <a:noFill/>
+            </p:spPr>
+            <p:txBody>
+              <a:bodyPr wrap="none" rtlCol="0">
+                <a:spAutoFit/>
+              </a:bodyPr>
+              <a:lstStyle/>
+              <a:p>
+                <a:r>
+                  <a:rPr lang="en-US" sz="900" b="1" dirty="0" smtClean="0">
+                    <a:solidFill>
+                      <a:srgbClr val="FF0000"/>
+                    </a:solidFill>
+                  </a:rPr>
+                  <a:t>TYMPAN A</a:t>
+                </a:r>
+                <a:endParaRPr lang="en-US" sz="900" b="1" dirty="0">
+                  <a:solidFill>
+                    <a:srgbClr val="FF0000"/>
+                  </a:solidFill>
+                </a:endParaRPr>
+              </a:p>
+            </p:txBody>
+          </p:sp>
+          <p:sp>
+            <p:nvSpPr>
+              <p:cNvPr id="90" name="TextBox 89"/>
+              <p:cNvSpPr txBox="1"/>
+              <p:nvPr/>
+            </p:nvSpPr>
+            <p:spPr>
+              <a:xfrm rot="5400000">
+                <a:off x="5982556" y="5488554"/>
+                <a:ext cx="252633" cy="113877"/>
+              </a:xfrm>
+              <a:prstGeom prst="rect">
+                <a:avLst/>
+              </a:prstGeom>
+              <a:noFill/>
+            </p:spPr>
+            <p:txBody>
+              <a:bodyPr wrap="none" lIns="45720" tIns="18288" rIns="45720" bIns="18288" rtlCol="0">
+                <a:spAutoFit/>
+              </a:bodyPr>
+              <a:lstStyle/>
+              <a:p>
+                <a:r>
+                  <a:rPr lang="en-US" sz="500" b="1" dirty="0" smtClean="0">
+                    <a:solidFill>
+                      <a:srgbClr val="FF0000"/>
+                    </a:solidFill>
+                  </a:rPr>
+                  <a:t>AGND</a:t>
+                </a:r>
+                <a:endParaRPr lang="en-US" sz="500" b="1" dirty="0">
+                  <a:solidFill>
+                    <a:srgbClr val="FF0000"/>
+                  </a:solidFill>
+                </a:endParaRPr>
+              </a:p>
+            </p:txBody>
+          </p:sp>
+          <p:sp>
+            <p:nvSpPr>
+              <p:cNvPr id="91" name="TextBox 90"/>
+              <p:cNvSpPr txBox="1"/>
+              <p:nvPr/>
+            </p:nvSpPr>
+            <p:spPr>
+              <a:xfrm rot="5400000">
+                <a:off x="6122187" y="5470290"/>
+                <a:ext cx="162865" cy="113877"/>
+              </a:xfrm>
+              <a:prstGeom prst="rect">
+                <a:avLst/>
+              </a:prstGeom>
+              <a:noFill/>
+            </p:spPr>
+            <p:txBody>
+              <a:bodyPr wrap="none" lIns="45720" tIns="18288" rIns="45720" bIns="18288" rtlCol="0">
+                <a:spAutoFit/>
+              </a:bodyPr>
+              <a:lstStyle/>
+              <a:p>
+                <a:pPr algn="r"/>
+                <a:r>
+                  <a:rPr lang="en-US" sz="500" b="1" dirty="0" smtClean="0">
+                    <a:solidFill>
+                      <a:srgbClr val="FF0000"/>
+                    </a:solidFill>
+                  </a:rPr>
+                  <a:t>A1</a:t>
+                </a:r>
+                <a:endParaRPr lang="en-US" sz="500" b="1" dirty="0">
+                  <a:solidFill>
+                    <a:srgbClr val="FF0000"/>
+                  </a:solidFill>
+                </a:endParaRPr>
+              </a:p>
+            </p:txBody>
+          </p:sp>
+          <p:sp>
+            <p:nvSpPr>
+              <p:cNvPr id="93" name="TextBox 92"/>
+              <p:cNvSpPr txBox="1"/>
+              <p:nvPr/>
+            </p:nvSpPr>
+            <p:spPr>
+              <a:xfrm rot="5400000">
+                <a:off x="6196111" y="5471881"/>
+                <a:ext cx="212559" cy="113877"/>
+              </a:xfrm>
+              <a:prstGeom prst="rect">
+                <a:avLst/>
+              </a:prstGeom>
+              <a:noFill/>
+            </p:spPr>
+            <p:txBody>
+              <a:bodyPr wrap="none" lIns="45720" tIns="18288" rIns="45720" bIns="18288" rtlCol="0">
+                <a:spAutoFit/>
+              </a:bodyPr>
+              <a:lstStyle/>
+              <a:p>
+                <a:r>
+                  <a:rPr lang="en-US" sz="500" b="1" dirty="0" smtClean="0">
+                    <a:solidFill>
+                      <a:srgbClr val="FF0000"/>
+                    </a:solidFill>
+                  </a:rPr>
+                  <a:t>3.3V</a:t>
+                </a:r>
+                <a:endParaRPr lang="en-US" sz="500" b="1" dirty="0">
+                  <a:solidFill>
+                    <a:srgbClr val="FF0000"/>
+                  </a:solidFill>
+                </a:endParaRPr>
+              </a:p>
+            </p:txBody>
+          </p:sp>
+          <p:sp>
+            <p:nvSpPr>
+              <p:cNvPr id="94" name="TextBox 93"/>
+              <p:cNvSpPr txBox="1"/>
+              <p:nvPr/>
+            </p:nvSpPr>
+            <p:spPr>
+              <a:xfrm rot="5400000">
+                <a:off x="4801569" y="3941995"/>
+                <a:ext cx="722314" cy="113877"/>
+              </a:xfrm>
+              <a:prstGeom prst="rect">
+                <a:avLst/>
+              </a:prstGeom>
+              <a:noFill/>
+            </p:spPr>
+            <p:txBody>
+              <a:bodyPr wrap="none" lIns="45720" tIns="18288" rIns="45720" bIns="18288" rtlCol="0">
+                <a:spAutoFit/>
+              </a:bodyPr>
+              <a:lstStyle/>
+              <a:p>
+                <a:r>
+                  <a:rPr lang="en-US" sz="500" b="1" dirty="0" smtClean="0">
+                    <a:solidFill>
+                      <a:srgbClr val="FF0000"/>
+                    </a:solidFill>
+                  </a:rPr>
+                  <a:t>Li-Ion / Li-Poly Charging</a:t>
+                </a:r>
+                <a:endParaRPr lang="en-US" sz="500" b="1" dirty="0">
+                  <a:solidFill>
+                    <a:srgbClr val="FF0000"/>
+                  </a:solidFill>
+                </a:endParaRPr>
+              </a:p>
+            </p:txBody>
+          </p:sp>
+          <p:sp>
+            <p:nvSpPr>
+              <p:cNvPr id="95" name="TextBox 94"/>
+              <p:cNvSpPr txBox="1"/>
+              <p:nvPr/>
+            </p:nvSpPr>
+            <p:spPr>
+              <a:xfrm rot="5400000">
+                <a:off x="5496666" y="3071269"/>
+                <a:ext cx="270267" cy="113877"/>
+              </a:xfrm>
+              <a:prstGeom prst="rect">
+                <a:avLst/>
+              </a:prstGeom>
+              <a:noFill/>
+            </p:spPr>
+            <p:txBody>
+              <a:bodyPr wrap="none" lIns="45720" tIns="18288" rIns="45720" bIns="18288" rtlCol="0">
+                <a:spAutoFit/>
+              </a:bodyPr>
+              <a:lstStyle/>
+              <a:p>
+                <a:r>
+                  <a:rPr lang="en-US" sz="500" b="1" dirty="0" smtClean="0">
+                    <a:solidFill>
+                      <a:srgbClr val="FF0000"/>
+                    </a:solidFill>
+                  </a:rPr>
+                  <a:t>V_USB</a:t>
+                </a:r>
+                <a:endParaRPr lang="en-US" sz="500" b="1" dirty="0">
+                  <a:solidFill>
+                    <a:srgbClr val="FF0000"/>
+                  </a:solidFill>
+                </a:endParaRPr>
+              </a:p>
+            </p:txBody>
+          </p:sp>
+          <p:sp>
+            <p:nvSpPr>
+              <p:cNvPr id="96" name="TextBox 95"/>
+              <p:cNvSpPr txBox="1"/>
+              <p:nvPr/>
+            </p:nvSpPr>
+            <p:spPr>
+              <a:xfrm>
+                <a:off x="6079630" y="4828153"/>
+                <a:ext cx="212559" cy="113877"/>
+              </a:xfrm>
+              <a:prstGeom prst="rect">
+                <a:avLst/>
+              </a:prstGeom>
+              <a:noFill/>
+            </p:spPr>
+            <p:txBody>
+              <a:bodyPr wrap="none" lIns="45720" tIns="18288" rIns="45720" bIns="18288" rtlCol="0">
+                <a:spAutoFit/>
+              </a:bodyPr>
+              <a:lstStyle/>
+              <a:p>
+                <a:pPr algn="r"/>
+                <a:r>
+                  <a:rPr lang="en-US" sz="500" b="1" dirty="0" smtClean="0">
+                    <a:solidFill>
+                      <a:srgbClr val="FF0000"/>
+                    </a:solidFill>
+                  </a:rPr>
+                  <a:t>1.8V</a:t>
+                </a:r>
+                <a:endParaRPr lang="en-US" sz="500" b="1" dirty="0">
+                  <a:solidFill>
+                    <a:srgbClr val="FF0000"/>
+                  </a:solidFill>
+                </a:endParaRPr>
+              </a:p>
+            </p:txBody>
+          </p:sp>
+          <p:sp>
+            <p:nvSpPr>
+              <p:cNvPr id="97" name="TextBox 96"/>
+              <p:cNvSpPr txBox="1"/>
+              <p:nvPr/>
+            </p:nvSpPr>
+            <p:spPr>
+              <a:xfrm>
+                <a:off x="6052380" y="4922978"/>
+                <a:ext cx="239809" cy="113877"/>
+              </a:xfrm>
+              <a:prstGeom prst="rect">
+                <a:avLst/>
+              </a:prstGeom>
+              <a:noFill/>
+            </p:spPr>
+            <p:txBody>
+              <a:bodyPr wrap="none" lIns="45720" tIns="18288" rIns="45720" bIns="18288" rtlCol="0">
+                <a:spAutoFit/>
+              </a:bodyPr>
+              <a:lstStyle/>
+              <a:p>
+                <a:pPr algn="r"/>
+                <a:r>
+                  <a:rPr lang="en-US" sz="500" b="1" dirty="0" smtClean="0">
+                    <a:solidFill>
+                      <a:srgbClr val="FF0000"/>
+                    </a:solidFill>
+                  </a:rPr>
+                  <a:t>MISO</a:t>
+                </a:r>
+                <a:endParaRPr lang="en-US" sz="500" b="1" dirty="0">
+                  <a:solidFill>
+                    <a:srgbClr val="FF0000"/>
+                  </a:solidFill>
+                </a:endParaRPr>
+              </a:p>
+            </p:txBody>
+          </p:sp>
+          <p:sp>
+            <p:nvSpPr>
+              <p:cNvPr id="98" name="TextBox 97"/>
+              <p:cNvSpPr txBox="1"/>
+              <p:nvPr/>
+            </p:nvSpPr>
+            <p:spPr>
+              <a:xfrm>
+                <a:off x="6073218" y="5014346"/>
+                <a:ext cx="218971" cy="113877"/>
+              </a:xfrm>
+              <a:prstGeom prst="rect">
+                <a:avLst/>
+              </a:prstGeom>
+              <a:noFill/>
+            </p:spPr>
+            <p:txBody>
+              <a:bodyPr wrap="none" lIns="45720" tIns="18288" rIns="45720" bIns="18288" rtlCol="0">
+                <a:spAutoFit/>
+              </a:bodyPr>
+              <a:lstStyle/>
+              <a:p>
+                <a:pPr algn="r"/>
+                <a:r>
+                  <a:rPr lang="en-US" sz="500" b="1" dirty="0" smtClean="0">
+                    <a:solidFill>
+                      <a:srgbClr val="FF0000"/>
+                    </a:solidFill>
+                  </a:rPr>
+                  <a:t>SCLK</a:t>
+                </a:r>
+                <a:endParaRPr lang="en-US" sz="500" b="1" dirty="0">
+                  <a:solidFill>
+                    <a:srgbClr val="FF0000"/>
+                  </a:solidFill>
+                </a:endParaRPr>
+              </a:p>
+            </p:txBody>
+          </p:sp>
+          <p:sp>
+            <p:nvSpPr>
+              <p:cNvPr id="99" name="TextBox 98"/>
+              <p:cNvSpPr txBox="1"/>
+              <p:nvPr/>
+            </p:nvSpPr>
+            <p:spPr>
+              <a:xfrm>
+                <a:off x="6078028" y="5104625"/>
+                <a:ext cx="214161" cy="113877"/>
+              </a:xfrm>
+              <a:prstGeom prst="rect">
+                <a:avLst/>
+              </a:prstGeom>
+              <a:noFill/>
+            </p:spPr>
+            <p:txBody>
+              <a:bodyPr wrap="none" lIns="45720" tIns="18288" rIns="45720" bIns="18288" rtlCol="0">
+                <a:spAutoFit/>
+              </a:bodyPr>
+              <a:lstStyle/>
+              <a:p>
+                <a:pPr algn="r"/>
+                <a:r>
+                  <a:rPr lang="en-US" sz="500" b="1" dirty="0" smtClean="0">
+                    <a:solidFill>
+                      <a:srgbClr val="FF0000"/>
+                    </a:solidFill>
+                  </a:rPr>
+                  <a:t>GND</a:t>
+                </a:r>
+                <a:endParaRPr lang="en-US" sz="500" b="1" dirty="0">
+                  <a:solidFill>
+                    <a:srgbClr val="FF0000"/>
+                  </a:solidFill>
+                </a:endParaRPr>
+              </a:p>
+            </p:txBody>
+          </p:sp>
+          <p:sp>
+            <p:nvSpPr>
+              <p:cNvPr id="100" name="TextBox 99"/>
+              <p:cNvSpPr txBox="1"/>
+              <p:nvPr/>
+            </p:nvSpPr>
+            <p:spPr>
+              <a:xfrm rot="5400000">
+                <a:off x="5126302" y="4347216"/>
+                <a:ext cx="216726" cy="169277"/>
+              </a:xfrm>
+              <a:prstGeom prst="rect">
+                <a:avLst/>
+              </a:prstGeom>
+              <a:noFill/>
+            </p:spPr>
+            <p:txBody>
+              <a:bodyPr wrap="none" rtlCol="0">
+                <a:spAutoFit/>
+              </a:bodyPr>
+              <a:lstStyle/>
+              <a:p>
+                <a:r>
+                  <a:rPr lang="en-US" sz="500" b="1" dirty="0" smtClean="0">
+                    <a:solidFill>
+                      <a:srgbClr val="FF0000"/>
+                    </a:solidFill>
+                  </a:rPr>
+                  <a:t>+</a:t>
+                </a:r>
+                <a:endParaRPr lang="en-US" sz="500" b="1" dirty="0">
+                  <a:solidFill>
+                    <a:srgbClr val="FF0000"/>
+                  </a:solidFill>
+                </a:endParaRPr>
+              </a:p>
+            </p:txBody>
+          </p:sp>
+          <p:sp>
+            <p:nvSpPr>
+              <p:cNvPr id="101" name="TextBox 100"/>
+              <p:cNvSpPr txBox="1"/>
+              <p:nvPr/>
+            </p:nvSpPr>
+            <p:spPr>
+              <a:xfrm rot="5400000">
+                <a:off x="5132714" y="4429858"/>
+                <a:ext cx="203902" cy="169277"/>
+              </a:xfrm>
+              <a:prstGeom prst="rect">
+                <a:avLst/>
+              </a:prstGeom>
+              <a:noFill/>
+            </p:spPr>
+            <p:txBody>
+              <a:bodyPr wrap="none" rtlCol="0">
+                <a:spAutoFit/>
+              </a:bodyPr>
+              <a:lstStyle/>
+              <a:p>
+                <a:r>
+                  <a:rPr lang="en-US" sz="500" b="1" dirty="0" smtClean="0">
+                    <a:solidFill>
+                      <a:srgbClr val="FF0000"/>
+                    </a:solidFill>
+                  </a:rPr>
+                  <a:t>-</a:t>
+                </a:r>
+                <a:endParaRPr lang="en-US" sz="500" b="1" dirty="0">
+                  <a:solidFill>
+                    <a:srgbClr val="FF0000"/>
+                  </a:solidFill>
+                </a:endParaRPr>
+              </a:p>
+            </p:txBody>
+          </p:sp>
+          <p:sp>
+            <p:nvSpPr>
+              <p:cNvPr id="102" name="TextBox 101"/>
+              <p:cNvSpPr txBox="1"/>
+              <p:nvPr/>
+            </p:nvSpPr>
+            <p:spPr>
+              <a:xfrm rot="5400000">
+                <a:off x="6163033" y="4634788"/>
+                <a:ext cx="124393" cy="113877"/>
+              </a:xfrm>
+              <a:prstGeom prst="rect">
+                <a:avLst/>
+              </a:prstGeom>
+              <a:noFill/>
+            </p:spPr>
+            <p:txBody>
+              <a:bodyPr wrap="none" lIns="45720" tIns="18288" rIns="45720" bIns="18288" rtlCol="0">
+                <a:spAutoFit/>
+              </a:bodyPr>
+              <a:lstStyle/>
+              <a:p>
+                <a:pPr algn="r"/>
+                <a:r>
+                  <a:rPr lang="en-US" sz="500" b="1" dirty="0" smtClean="0">
+                    <a:solidFill>
+                      <a:srgbClr val="FF0000"/>
+                    </a:solidFill>
+                  </a:rPr>
+                  <a:t>+</a:t>
+                </a:r>
+                <a:endParaRPr lang="en-US" sz="500" b="1" dirty="0">
+                  <a:solidFill>
+                    <a:srgbClr val="FF0000"/>
+                  </a:solidFill>
+                </a:endParaRPr>
+              </a:p>
+            </p:txBody>
+          </p:sp>
+          <p:sp>
+            <p:nvSpPr>
+              <p:cNvPr id="103" name="TextBox 102"/>
+              <p:cNvSpPr txBox="1"/>
+              <p:nvPr/>
+            </p:nvSpPr>
+            <p:spPr>
+              <a:xfrm rot="5400000">
+                <a:off x="6251725" y="4644314"/>
+                <a:ext cx="132409" cy="113877"/>
+              </a:xfrm>
+              <a:prstGeom prst="rect">
+                <a:avLst/>
+              </a:prstGeom>
+              <a:noFill/>
+            </p:spPr>
+            <p:txBody>
+              <a:bodyPr wrap="none" lIns="45720" tIns="18288" rIns="45720" bIns="18288" rtlCol="0">
+                <a:spAutoFit/>
+              </a:bodyPr>
+              <a:lstStyle/>
+              <a:p>
+                <a:pPr algn="r"/>
+                <a:r>
+                  <a:rPr lang="en-US" sz="500" b="1" dirty="0" smtClean="0">
+                    <a:solidFill>
+                      <a:srgbClr val="FF0000"/>
+                    </a:solidFill>
+                  </a:rPr>
+                  <a:t>G</a:t>
+                </a:r>
+                <a:endParaRPr lang="en-US" sz="500" b="1" dirty="0">
+                  <a:solidFill>
+                    <a:srgbClr val="FF0000"/>
+                  </a:solidFill>
+                </a:endParaRPr>
+              </a:p>
+            </p:txBody>
+          </p:sp>
+          <p:sp>
+            <p:nvSpPr>
+              <p:cNvPr id="104" name="TextBox 103"/>
+              <p:cNvSpPr txBox="1"/>
+              <p:nvPr/>
+            </p:nvSpPr>
+            <p:spPr>
+              <a:xfrm rot="5400000">
+                <a:off x="6057465" y="4136404"/>
+                <a:ext cx="119584" cy="113877"/>
+              </a:xfrm>
+              <a:prstGeom prst="rect">
+                <a:avLst/>
+              </a:prstGeom>
+              <a:noFill/>
+            </p:spPr>
+            <p:txBody>
+              <a:bodyPr wrap="none" lIns="45720" tIns="18288" rIns="45720" bIns="18288" rtlCol="0">
+                <a:spAutoFit/>
+              </a:bodyPr>
+              <a:lstStyle/>
+              <a:p>
+                <a:pPr algn="r"/>
+                <a:r>
+                  <a:rPr lang="en-US" sz="500" b="1" dirty="0" smtClean="0">
+                    <a:solidFill>
+                      <a:srgbClr val="FF0000"/>
+                    </a:solidFill>
+                  </a:rPr>
+                  <a:t>L</a:t>
+                </a:r>
+                <a:endParaRPr lang="en-US" sz="500" b="1" dirty="0">
+                  <a:solidFill>
+                    <a:srgbClr val="FF0000"/>
+                  </a:solidFill>
+                </a:endParaRPr>
+              </a:p>
+            </p:txBody>
+          </p:sp>
+          <p:sp>
+            <p:nvSpPr>
+              <p:cNvPr id="105" name="TextBox 104"/>
+              <p:cNvSpPr txBox="1"/>
+              <p:nvPr/>
+            </p:nvSpPr>
+            <p:spPr>
+              <a:xfrm rot="5400000">
+                <a:off x="6052656" y="4222124"/>
+                <a:ext cx="129203" cy="113877"/>
+              </a:xfrm>
+              <a:prstGeom prst="rect">
+                <a:avLst/>
+              </a:prstGeom>
+              <a:noFill/>
+            </p:spPr>
+            <p:txBody>
+              <a:bodyPr wrap="none" lIns="45720" tIns="18288" rIns="45720" bIns="18288" rtlCol="0">
+                <a:spAutoFit/>
+              </a:bodyPr>
+              <a:lstStyle/>
+              <a:p>
+                <a:pPr algn="r"/>
+                <a:r>
+                  <a:rPr lang="en-US" sz="500" b="1" dirty="0" smtClean="0">
+                    <a:solidFill>
+                      <a:srgbClr val="FF0000"/>
+                    </a:solidFill>
+                  </a:rPr>
+                  <a:t>R</a:t>
+                </a:r>
+                <a:endParaRPr lang="en-US" sz="500" b="1" dirty="0">
+                  <a:solidFill>
+                    <a:srgbClr val="FF0000"/>
+                  </a:solidFill>
+                </a:endParaRPr>
+              </a:p>
+            </p:txBody>
+          </p:sp>
+          <p:sp>
+            <p:nvSpPr>
+              <p:cNvPr id="106" name="TextBox 105"/>
+              <p:cNvSpPr txBox="1"/>
+              <p:nvPr/>
+            </p:nvSpPr>
+            <p:spPr>
+              <a:xfrm rot="5400000">
+                <a:off x="6057465" y="4462161"/>
+                <a:ext cx="119584" cy="113877"/>
+              </a:xfrm>
+              <a:prstGeom prst="rect">
+                <a:avLst/>
+              </a:prstGeom>
+              <a:noFill/>
+            </p:spPr>
+            <p:txBody>
+              <a:bodyPr wrap="none" lIns="45720" tIns="18288" rIns="45720" bIns="18288" rtlCol="0">
+                <a:spAutoFit/>
+              </a:bodyPr>
+              <a:lstStyle/>
+              <a:p>
+                <a:pPr algn="r"/>
+                <a:r>
+                  <a:rPr lang="en-US" sz="500" b="1" dirty="0" smtClean="0">
+                    <a:solidFill>
+                      <a:srgbClr val="FF0000"/>
+                    </a:solidFill>
+                  </a:rPr>
+                  <a:t>L</a:t>
+                </a:r>
+                <a:endParaRPr lang="en-US" sz="500" b="1" dirty="0">
+                  <a:solidFill>
+                    <a:srgbClr val="FF0000"/>
+                  </a:solidFill>
+                </a:endParaRPr>
+              </a:p>
+            </p:txBody>
+          </p:sp>
+          <p:sp>
+            <p:nvSpPr>
+              <p:cNvPr id="107" name="TextBox 106"/>
+              <p:cNvSpPr txBox="1"/>
+              <p:nvPr/>
+            </p:nvSpPr>
+            <p:spPr>
+              <a:xfrm rot="5400000">
+                <a:off x="6052656" y="4547881"/>
+                <a:ext cx="129203" cy="113877"/>
+              </a:xfrm>
+              <a:prstGeom prst="rect">
+                <a:avLst/>
+              </a:prstGeom>
+              <a:noFill/>
+            </p:spPr>
+            <p:txBody>
+              <a:bodyPr wrap="none" lIns="45720" tIns="18288" rIns="45720" bIns="18288" rtlCol="0">
+                <a:spAutoFit/>
+              </a:bodyPr>
+              <a:lstStyle/>
+              <a:p>
+                <a:pPr algn="r"/>
+                <a:r>
+                  <a:rPr lang="en-US" sz="500" b="1" dirty="0" smtClean="0">
+                    <a:solidFill>
+                      <a:srgbClr val="FF0000"/>
+                    </a:solidFill>
+                  </a:rPr>
+                  <a:t>R</a:t>
+                </a:r>
+                <a:endParaRPr lang="en-US" sz="500" b="1" dirty="0">
+                  <a:solidFill>
+                    <a:srgbClr val="FF0000"/>
+                  </a:solidFill>
+                </a:endParaRPr>
+              </a:p>
+            </p:txBody>
+          </p:sp>
+          <p:sp>
+            <p:nvSpPr>
+              <p:cNvPr id="108" name="TextBox 107"/>
+              <p:cNvSpPr txBox="1"/>
+              <p:nvPr/>
+            </p:nvSpPr>
+            <p:spPr>
+              <a:xfrm rot="5400000">
+                <a:off x="6177197" y="4018970"/>
+                <a:ext cx="183705" cy="113877"/>
+              </a:xfrm>
+              <a:prstGeom prst="rect">
+                <a:avLst/>
+              </a:prstGeom>
+              <a:noFill/>
+            </p:spPr>
+            <p:txBody>
+              <a:bodyPr wrap="none" lIns="45720" tIns="18288" rIns="45720" bIns="18288" rtlCol="0">
+                <a:spAutoFit/>
+              </a:bodyPr>
+              <a:lstStyle/>
+              <a:p>
+                <a:pPr algn="r"/>
+                <a:r>
+                  <a:rPr lang="en-US" sz="500" b="1" dirty="0" smtClean="0">
+                    <a:solidFill>
+                      <a:srgbClr val="FF0000"/>
+                    </a:solidFill>
+                  </a:rPr>
+                  <a:t>IN1</a:t>
+                </a:r>
+                <a:endParaRPr lang="en-US" sz="500" b="1" dirty="0">
+                  <a:solidFill>
+                    <a:srgbClr val="FF0000"/>
+                  </a:solidFill>
+                </a:endParaRPr>
+              </a:p>
+            </p:txBody>
+          </p:sp>
+          <p:sp>
+            <p:nvSpPr>
+              <p:cNvPr id="109" name="TextBox 108"/>
+              <p:cNvSpPr txBox="1"/>
+              <p:nvPr/>
+            </p:nvSpPr>
+            <p:spPr>
+              <a:xfrm rot="5400000">
+                <a:off x="6187617" y="4361652"/>
+                <a:ext cx="162865" cy="113877"/>
+              </a:xfrm>
+              <a:prstGeom prst="rect">
+                <a:avLst/>
+              </a:prstGeom>
+              <a:noFill/>
+            </p:spPr>
+            <p:txBody>
+              <a:bodyPr wrap="none" lIns="45720" tIns="18288" rIns="45720" bIns="18288" rtlCol="0">
+                <a:spAutoFit/>
+              </a:bodyPr>
+              <a:lstStyle/>
+              <a:p>
+                <a:pPr algn="r"/>
+                <a:r>
+                  <a:rPr lang="en-US" sz="500" b="1" dirty="0" smtClean="0">
+                    <a:solidFill>
+                      <a:srgbClr val="FF0000"/>
+                    </a:solidFill>
+                  </a:rPr>
+                  <a:t>LO</a:t>
+                </a:r>
+                <a:endParaRPr lang="en-US" sz="500" b="1" dirty="0">
+                  <a:solidFill>
+                    <a:srgbClr val="FF0000"/>
+                  </a:solidFill>
+                </a:endParaRPr>
+              </a:p>
+            </p:txBody>
+          </p:sp>
+        </p:grpSp>
+      </p:grpSp>
+      <p:sp>
+        <p:nvSpPr>
+          <p:cNvPr id="2" name="Title 1"/>
+          <p:cNvSpPr>
+            <a:spLocks noGrp="1"/>
+          </p:cNvSpPr>
+          <p:nvPr>
+            <p:ph type="title"/>
+          </p:nvPr>
+        </p:nvSpPr>
+        <p:spPr/>
+        <p:txBody>
+          <a:bodyPr/>
+          <a:lstStyle/>
+          <a:p>
+            <a:r>
+              <a:rPr lang="en-US" dirty="0" smtClean="0"/>
+              <a:t>Silkscreen</a:t>
+            </a:r>
+            <a:endParaRPr lang="en-US" dirty="0"/>
+          </a:p>
+        </p:txBody>
+      </p:sp>
+    </p:spTree>
+    <p:extLst>
+      <p:ext uri="{BB962C8B-B14F-4D97-AF65-F5344CB8AC3E}">
+        <p14:creationId xmlns:p14="http://schemas.microsoft.com/office/powerpoint/2010/main" val="1545251472"/>
+      </p:ext>
+    </p:extLst>
+  </p:cSld>
+  <p:clrMapOvr>
+    <a:masterClrMapping/>
+  </p:clrMapOvr>
 </p:sld>
 </file>
 

</xml_diff>